<commit_message>
Add sound detector class Clean warnings
</commit_message>
<xml_diff>
--- a/libraries/Diagramm Robot v2.pptx
+++ b/libraries/Diagramm Robot v2.pptx
@@ -267,7 +267,7 @@
           <a:p>
             <a:fld id="{0717AEF8-1597-4679-8926-916E82E12B07}" type="datetimeFigureOut">
               <a:rPr lang="fr-FR" smtClean="0"/>
-              <a:t>19/12/2018</a:t>
+              <a:t>20/12/2018</a:t>
             </a:fld>
             <a:endParaRPr lang="fr-FR"/>
           </a:p>
@@ -465,7 +465,7 @@
           <a:p>
             <a:fld id="{0717AEF8-1597-4679-8926-916E82E12B07}" type="datetimeFigureOut">
               <a:rPr lang="fr-FR" smtClean="0"/>
-              <a:t>19/12/2018</a:t>
+              <a:t>20/12/2018</a:t>
             </a:fld>
             <a:endParaRPr lang="fr-FR"/>
           </a:p>
@@ -673,7 +673,7 @@
           <a:p>
             <a:fld id="{0717AEF8-1597-4679-8926-916E82E12B07}" type="datetimeFigureOut">
               <a:rPr lang="fr-FR" smtClean="0"/>
-              <a:t>19/12/2018</a:t>
+              <a:t>20/12/2018</a:t>
             </a:fld>
             <a:endParaRPr lang="fr-FR"/>
           </a:p>
@@ -871,7 +871,7 @@
           <a:p>
             <a:fld id="{0717AEF8-1597-4679-8926-916E82E12B07}" type="datetimeFigureOut">
               <a:rPr lang="fr-FR" smtClean="0"/>
-              <a:t>19/12/2018</a:t>
+              <a:t>20/12/2018</a:t>
             </a:fld>
             <a:endParaRPr lang="fr-FR"/>
           </a:p>
@@ -1146,7 +1146,7 @@
           <a:p>
             <a:fld id="{0717AEF8-1597-4679-8926-916E82E12B07}" type="datetimeFigureOut">
               <a:rPr lang="fr-FR" smtClean="0"/>
-              <a:t>19/12/2018</a:t>
+              <a:t>20/12/2018</a:t>
             </a:fld>
             <a:endParaRPr lang="fr-FR"/>
           </a:p>
@@ -1411,7 +1411,7 @@
           <a:p>
             <a:fld id="{0717AEF8-1597-4679-8926-916E82E12B07}" type="datetimeFigureOut">
               <a:rPr lang="fr-FR" smtClean="0"/>
-              <a:t>19/12/2018</a:t>
+              <a:t>20/12/2018</a:t>
             </a:fld>
             <a:endParaRPr lang="fr-FR"/>
           </a:p>
@@ -1823,7 +1823,7 @@
           <a:p>
             <a:fld id="{0717AEF8-1597-4679-8926-916E82E12B07}" type="datetimeFigureOut">
               <a:rPr lang="fr-FR" smtClean="0"/>
-              <a:t>19/12/2018</a:t>
+              <a:t>20/12/2018</a:t>
             </a:fld>
             <a:endParaRPr lang="fr-FR"/>
           </a:p>
@@ -1964,7 +1964,7 @@
           <a:p>
             <a:fld id="{0717AEF8-1597-4679-8926-916E82E12B07}" type="datetimeFigureOut">
               <a:rPr lang="fr-FR" smtClean="0"/>
-              <a:t>19/12/2018</a:t>
+              <a:t>20/12/2018</a:t>
             </a:fld>
             <a:endParaRPr lang="fr-FR"/>
           </a:p>
@@ -2077,7 +2077,7 @@
           <a:p>
             <a:fld id="{0717AEF8-1597-4679-8926-916E82E12B07}" type="datetimeFigureOut">
               <a:rPr lang="fr-FR" smtClean="0"/>
-              <a:t>19/12/2018</a:t>
+              <a:t>20/12/2018</a:t>
             </a:fld>
             <a:endParaRPr lang="fr-FR"/>
           </a:p>
@@ -2388,7 +2388,7 @@
           <a:p>
             <a:fld id="{0717AEF8-1597-4679-8926-916E82E12B07}" type="datetimeFigureOut">
               <a:rPr lang="fr-FR" smtClean="0"/>
-              <a:t>19/12/2018</a:t>
+              <a:t>20/12/2018</a:t>
             </a:fld>
             <a:endParaRPr lang="fr-FR"/>
           </a:p>
@@ -2676,7 +2676,7 @@
           <a:p>
             <a:fld id="{0717AEF8-1597-4679-8926-916E82E12B07}" type="datetimeFigureOut">
               <a:rPr lang="fr-FR" smtClean="0"/>
-              <a:t>19/12/2018</a:t>
+              <a:t>20/12/2018</a:t>
             </a:fld>
             <a:endParaRPr lang="fr-FR"/>
           </a:p>
@@ -2917,7 +2917,7 @@
           <a:p>
             <a:fld id="{0717AEF8-1597-4679-8926-916E82E12B07}" type="datetimeFigureOut">
               <a:rPr lang="fr-FR" smtClean="0"/>
-              <a:t>19/12/2018</a:t>
+              <a:t>20/12/2018</a:t>
             </a:fld>
             <a:endParaRPr lang="fr-FR"/>
           </a:p>
@@ -3336,10 +3336,10 @@
       </p:grpSpPr>
       <p:sp>
         <p:nvSpPr>
-          <p:cNvPr id="4" name="Rectangle 3">
-            <a:extLst>
-              <a:ext uri="{FF2B5EF4-FFF2-40B4-BE49-F238E27FC236}">
-                <a16:creationId xmlns:a16="http://schemas.microsoft.com/office/drawing/2014/main" id="{D6A19F59-DE5C-47E6-918B-27D303F45183}"/>
+          <p:cNvPr id="50" name="Nuage 49">
+            <a:extLst>
+              <a:ext uri="{FF2B5EF4-FFF2-40B4-BE49-F238E27FC236}">
+                <a16:creationId xmlns:a16="http://schemas.microsoft.com/office/drawing/2014/main" id="{C4AA5520-5B3C-4CE1-92C1-93A8C3D830BE}"/>
               </a:ext>
             </a:extLst>
           </p:cNvPr>
@@ -3348,12 +3348,18 @@
         </p:nvSpPr>
         <p:spPr>
           <a:xfrm>
-            <a:off x="4658175" y="3230798"/>
-            <a:ext cx="4969601" cy="1083076"/>
-          </a:xfrm>
-          <a:prstGeom prst="rect">
-            <a:avLst/>
-          </a:prstGeom>
+            <a:off x="3875970" y="4429419"/>
+            <a:ext cx="1792296" cy="1039716"/>
+          </a:xfrm>
+          <a:prstGeom prst="cloud">
+            <a:avLst/>
+          </a:prstGeom>
+          <a:solidFill>
+            <a:schemeClr val="accent4">
+              <a:lumMod val="60000"/>
+              <a:lumOff val="40000"/>
+            </a:schemeClr>
+          </a:solidFill>
         </p:spPr>
         <p:style>
           <a:lnRef idx="2">
@@ -3377,18 +3383,25 @@
           <a:p>
             <a:pPr algn="ctr"/>
             <a:r>
-              <a:rPr lang="fr-FR" dirty="0"/>
-              <a:t>Arduino</a:t>
-            </a:r>
-          </a:p>
-        </p:txBody>
-      </p:sp>
-      <p:sp>
-        <p:nvSpPr>
-          <p:cNvPr id="5" name="Rectangle 4">
-            <a:extLst>
-              <a:ext uri="{FF2B5EF4-FFF2-40B4-BE49-F238E27FC236}">
-                <a16:creationId xmlns:a16="http://schemas.microsoft.com/office/drawing/2014/main" id="{0CB519F8-5C43-49C5-B4E7-9718D5910344}"/>
+              <a:rPr lang="fr-FR" sz="1200" dirty="0"/>
+              <a:t>SSID:</a:t>
+            </a:r>
+          </a:p>
+          <a:p>
+            <a:pPr algn="ctr"/>
+            <a:r>
+              <a:rPr lang="fr-FR" sz="1200" dirty="0"/>
+              <a:t>WIFICOTEAU</a:t>
+            </a:r>
+          </a:p>
+        </p:txBody>
+      </p:sp>
+      <p:sp>
+        <p:nvSpPr>
+          <p:cNvPr id="56" name="Nuage 55">
+            <a:extLst>
+              <a:ext uri="{FF2B5EF4-FFF2-40B4-BE49-F238E27FC236}">
+                <a16:creationId xmlns:a16="http://schemas.microsoft.com/office/drawing/2014/main" id="{EBD23622-97AE-43B3-A20A-C70C5CFE819E}"/>
               </a:ext>
             </a:extLst>
           </p:cNvPr>
@@ -3397,14 +3410,14 @@
         </p:nvSpPr>
         <p:spPr>
           <a:xfrm>
-            <a:off x="6241003" y="844780"/>
-            <a:ext cx="3147072" cy="1168912"/>
-          </a:xfrm>
-          <a:prstGeom prst="rect">
+            <a:off x="2670047" y="3772336"/>
+            <a:ext cx="1792296" cy="1039716"/>
+          </a:xfrm>
+          <a:prstGeom prst="cloud">
             <a:avLst/>
           </a:prstGeom>
           <a:solidFill>
-            <a:schemeClr val="accent1">
+            <a:schemeClr val="accent4">
               <a:lumMod val="60000"/>
               <a:lumOff val="40000"/>
             </a:schemeClr>
@@ -3430,6 +3443,179 @@
           <a:bodyPr rtlCol="0" anchor="ctr"/>
           <a:lstStyle/>
           <a:p>
+            <a:pPr algn="ctr"/>
+            <a:r>
+              <a:rPr lang="fr-FR" sz="1200" dirty="0"/>
+              <a:t>SSID:</a:t>
+            </a:r>
+          </a:p>
+          <a:p>
+            <a:pPr algn="ctr"/>
+            <a:r>
+              <a:rPr lang="fr-FR" sz="1200" dirty="0"/>
+              <a:t>WIFICOTEAU2</a:t>
+            </a:r>
+          </a:p>
+        </p:txBody>
+      </p:sp>
+      <p:sp>
+        <p:nvSpPr>
+          <p:cNvPr id="57" name="Nuage 56">
+            <a:extLst>
+              <a:ext uri="{FF2B5EF4-FFF2-40B4-BE49-F238E27FC236}">
+                <a16:creationId xmlns:a16="http://schemas.microsoft.com/office/drawing/2014/main" id="{C1D8CE25-B978-4BF3-AD79-63C2D32567B7}"/>
+              </a:ext>
+            </a:extLst>
+          </p:cNvPr>
+          <p:cNvSpPr/>
+          <p:nvPr/>
+        </p:nvSpPr>
+        <p:spPr>
+          <a:xfrm>
+            <a:off x="2508919" y="1708426"/>
+            <a:ext cx="1792296" cy="1039716"/>
+          </a:xfrm>
+          <a:prstGeom prst="cloud">
+            <a:avLst/>
+          </a:prstGeom>
+          <a:solidFill>
+            <a:schemeClr val="accent4">
+              <a:lumMod val="60000"/>
+              <a:lumOff val="40000"/>
+            </a:schemeClr>
+          </a:solidFill>
+        </p:spPr>
+        <p:style>
+          <a:lnRef idx="2">
+            <a:schemeClr val="accent1">
+              <a:shade val="50000"/>
+            </a:schemeClr>
+          </a:lnRef>
+          <a:fillRef idx="1">
+            <a:schemeClr val="accent1"/>
+          </a:fillRef>
+          <a:effectRef idx="0">
+            <a:schemeClr val="accent1"/>
+          </a:effectRef>
+          <a:fontRef idx="minor">
+            <a:schemeClr val="lt1"/>
+          </a:fontRef>
+        </p:style>
+        <p:txBody>
+          <a:bodyPr rtlCol="0" anchor="ctr"/>
+          <a:lstStyle/>
+          <a:p>
+            <a:pPr algn="ctr"/>
+            <a:r>
+              <a:rPr lang="fr-FR" sz="1200" dirty="0"/>
+              <a:t>SSID:</a:t>
+            </a:r>
+          </a:p>
+          <a:p>
+            <a:pPr algn="ctr"/>
+            <a:r>
+              <a:rPr lang="fr-FR" sz="1200" dirty="0"/>
+              <a:t>WIFICOTEAU2</a:t>
+            </a:r>
+          </a:p>
+        </p:txBody>
+      </p:sp>
+      <p:sp>
+        <p:nvSpPr>
+          <p:cNvPr id="4" name="Rectangle 3">
+            <a:extLst>
+              <a:ext uri="{FF2B5EF4-FFF2-40B4-BE49-F238E27FC236}">
+                <a16:creationId xmlns:a16="http://schemas.microsoft.com/office/drawing/2014/main" id="{D6A19F59-DE5C-47E6-918B-27D303F45183}"/>
+              </a:ext>
+            </a:extLst>
+          </p:cNvPr>
+          <p:cNvSpPr/>
+          <p:nvPr/>
+        </p:nvSpPr>
+        <p:spPr>
+          <a:xfrm>
+            <a:off x="4658175" y="3230798"/>
+            <a:ext cx="4969601" cy="1083076"/>
+          </a:xfrm>
+          <a:prstGeom prst="rect">
+            <a:avLst/>
+          </a:prstGeom>
+        </p:spPr>
+        <p:style>
+          <a:lnRef idx="2">
+            <a:schemeClr val="accent1">
+              <a:shade val="50000"/>
+            </a:schemeClr>
+          </a:lnRef>
+          <a:fillRef idx="1">
+            <a:schemeClr val="accent1"/>
+          </a:fillRef>
+          <a:effectRef idx="0">
+            <a:schemeClr val="accent1"/>
+          </a:effectRef>
+          <a:fontRef idx="minor">
+            <a:schemeClr val="lt1"/>
+          </a:fontRef>
+        </p:style>
+        <p:txBody>
+          <a:bodyPr rtlCol="0" anchor="ctr"/>
+          <a:lstStyle/>
+          <a:p>
+            <a:pPr algn="ctr"/>
+            <a:r>
+              <a:rPr lang="fr-FR" dirty="0"/>
+              <a:t>Arduino</a:t>
+            </a:r>
+          </a:p>
+        </p:txBody>
+      </p:sp>
+      <p:sp>
+        <p:nvSpPr>
+          <p:cNvPr id="5" name="Rectangle 4">
+            <a:extLst>
+              <a:ext uri="{FF2B5EF4-FFF2-40B4-BE49-F238E27FC236}">
+                <a16:creationId xmlns:a16="http://schemas.microsoft.com/office/drawing/2014/main" id="{0CB519F8-5C43-49C5-B4E7-9718D5910344}"/>
+              </a:ext>
+            </a:extLst>
+          </p:cNvPr>
+          <p:cNvSpPr/>
+          <p:nvPr/>
+        </p:nvSpPr>
+        <p:spPr>
+          <a:xfrm>
+            <a:off x="6241003" y="844780"/>
+            <a:ext cx="3147072" cy="1168912"/>
+          </a:xfrm>
+          <a:prstGeom prst="rect">
+            <a:avLst/>
+          </a:prstGeom>
+          <a:solidFill>
+            <a:schemeClr val="accent1">
+              <a:lumMod val="60000"/>
+              <a:lumOff val="40000"/>
+            </a:schemeClr>
+          </a:solidFill>
+        </p:spPr>
+        <p:style>
+          <a:lnRef idx="2">
+            <a:schemeClr val="accent1">
+              <a:shade val="50000"/>
+            </a:schemeClr>
+          </a:lnRef>
+          <a:fillRef idx="1">
+            <a:schemeClr val="accent1"/>
+          </a:fillRef>
+          <a:effectRef idx="0">
+            <a:schemeClr val="accent1"/>
+          </a:effectRef>
+          <a:fontRef idx="minor">
+            <a:schemeClr val="lt1"/>
+          </a:fontRef>
+        </p:style>
+        <p:txBody>
+          <a:bodyPr rtlCol="0" anchor="ctr"/>
+          <a:lstStyle/>
+          <a:p>
             <a:r>
               <a:rPr lang="fr-FR" dirty="0"/>
               <a:t>ESP8266</a:t>
@@ -3482,7 +3668,7 @@
         </p:nvSpPr>
         <p:spPr>
           <a:xfrm>
-            <a:off x="4059133" y="138499"/>
+            <a:off x="4059133" y="151811"/>
             <a:ext cx="1613465" cy="1562212"/>
           </a:xfrm>
           <a:prstGeom prst="cloud">
@@ -4750,7 +4936,7 @@
         </p:nvSpPr>
         <p:spPr>
           <a:xfrm>
-            <a:off x="2100521" y="3230798"/>
+            <a:off x="2112705" y="3237335"/>
             <a:ext cx="1558290" cy="646331"/>
           </a:xfrm>
           <a:prstGeom prst="rect">
@@ -5901,7 +6087,7 @@
         </p:nvSpPr>
         <p:spPr>
           <a:xfrm>
-            <a:off x="1048960" y="704098"/>
+            <a:off x="1641541" y="1163661"/>
             <a:ext cx="2285540" cy="646331"/>
           </a:xfrm>
           <a:prstGeom prst="rect">
@@ -5933,131 +6119,6 @@
               <a:rPr lang="en-US" dirty="0"/>
               <a:t>Mail pictures</a:t>
             </a:r>
-          </a:p>
-        </p:txBody>
-      </p:sp>
-      <p:sp>
-        <p:nvSpPr>
-          <p:cNvPr id="50" name="Nuage 49">
-            <a:extLst>
-              <a:ext uri="{FF2B5EF4-FFF2-40B4-BE49-F238E27FC236}">
-                <a16:creationId xmlns:a16="http://schemas.microsoft.com/office/drawing/2014/main" id="{C4AA5520-5B3C-4CE1-92C1-93A8C3D830BE}"/>
-              </a:ext>
-            </a:extLst>
-          </p:cNvPr>
-          <p:cNvSpPr/>
-          <p:nvPr/>
-        </p:nvSpPr>
-        <p:spPr>
-          <a:xfrm>
-            <a:off x="3706709" y="4437721"/>
-            <a:ext cx="1792296" cy="1039716"/>
-          </a:xfrm>
-          <a:prstGeom prst="cloud">
-            <a:avLst/>
-          </a:prstGeom>
-          <a:solidFill>
-            <a:schemeClr val="accent4">
-              <a:lumMod val="60000"/>
-              <a:lumOff val="40000"/>
-            </a:schemeClr>
-          </a:solidFill>
-        </p:spPr>
-        <p:style>
-          <a:lnRef idx="2">
-            <a:schemeClr val="accent1">
-              <a:shade val="50000"/>
-            </a:schemeClr>
-          </a:lnRef>
-          <a:fillRef idx="1">
-            <a:schemeClr val="accent1"/>
-          </a:fillRef>
-          <a:effectRef idx="0">
-            <a:schemeClr val="accent1"/>
-          </a:effectRef>
-          <a:fontRef idx="minor">
-            <a:schemeClr val="lt1"/>
-          </a:fontRef>
-        </p:style>
-        <p:txBody>
-          <a:bodyPr rtlCol="0" anchor="ctr"/>
-          <a:lstStyle/>
-          <a:p>
-            <a:pPr algn="ctr"/>
-            <a:r>
-              <a:rPr lang="fr-FR" sz="1200" dirty="0"/>
-              <a:t>SSID:</a:t>
-            </a:r>
-          </a:p>
-          <a:p>
-            <a:pPr algn="ctr"/>
-            <a:r>
-              <a:rPr lang="fr-FR" sz="1200" dirty="0"/>
-              <a:t>WIFICOTEAU</a:t>
-            </a:r>
-          </a:p>
-        </p:txBody>
-      </p:sp>
-      <p:sp>
-        <p:nvSpPr>
-          <p:cNvPr id="56" name="Nuage 55">
-            <a:extLst>
-              <a:ext uri="{FF2B5EF4-FFF2-40B4-BE49-F238E27FC236}">
-                <a16:creationId xmlns:a16="http://schemas.microsoft.com/office/drawing/2014/main" id="{EBD23622-97AE-43B3-A20A-C70C5CFE819E}"/>
-              </a:ext>
-            </a:extLst>
-          </p:cNvPr>
-          <p:cNvSpPr/>
-          <p:nvPr/>
-        </p:nvSpPr>
-        <p:spPr>
-          <a:xfrm>
-            <a:off x="2837354" y="3746512"/>
-            <a:ext cx="1792296" cy="1039716"/>
-          </a:xfrm>
-          <a:prstGeom prst="cloud">
-            <a:avLst/>
-          </a:prstGeom>
-          <a:solidFill>
-            <a:schemeClr val="accent4">
-              <a:lumMod val="60000"/>
-              <a:lumOff val="40000"/>
-            </a:schemeClr>
-          </a:solidFill>
-        </p:spPr>
-        <p:style>
-          <a:lnRef idx="2">
-            <a:schemeClr val="accent1">
-              <a:shade val="50000"/>
-            </a:schemeClr>
-          </a:lnRef>
-          <a:fillRef idx="1">
-            <a:schemeClr val="accent1"/>
-          </a:fillRef>
-          <a:effectRef idx="0">
-            <a:schemeClr val="accent1"/>
-          </a:effectRef>
-          <a:fontRef idx="minor">
-            <a:schemeClr val="lt1"/>
-          </a:fontRef>
-        </p:style>
-        <p:txBody>
-          <a:bodyPr rtlCol="0" anchor="ctr"/>
-          <a:lstStyle/>
-          <a:p>
-            <a:pPr algn="ctr"/>
-            <a:r>
-              <a:rPr lang="fr-FR" sz="1200" dirty="0"/>
-              <a:t>SSID:</a:t>
-            </a:r>
-          </a:p>
-          <a:p>
-            <a:pPr algn="ctr"/>
-            <a:r>
-              <a:rPr lang="fr-FR" sz="1200"/>
-              <a:t>WIFICOTEAU2</a:t>
-            </a:r>
-            <a:endParaRPr lang="fr-FR" sz="1200" dirty="0"/>
           </a:p>
         </p:txBody>
       </p:sp>
@@ -13481,6 +13542,246 @@
           </a:p>
         </p:txBody>
       </p:sp>
+      <p:sp>
+        <p:nvSpPr>
+          <p:cNvPr id="157" name="Ellipse 156">
+            <a:extLst>
+              <a:ext uri="{FF2B5EF4-FFF2-40B4-BE49-F238E27FC236}">
+                <a16:creationId xmlns:a16="http://schemas.microsoft.com/office/drawing/2014/main" id="{434E2A6D-080F-4DEF-A105-B7909FF73023}"/>
+              </a:ext>
+            </a:extLst>
+          </p:cNvPr>
+          <p:cNvSpPr/>
+          <p:nvPr/>
+        </p:nvSpPr>
+        <p:spPr>
+          <a:xfrm>
+            <a:off x="3312968" y="5435785"/>
+            <a:ext cx="479833" cy="220039"/>
+          </a:xfrm>
+          <a:prstGeom prst="ellipse">
+            <a:avLst/>
+          </a:prstGeom>
+          <a:solidFill>
+            <a:schemeClr val="bg2">
+              <a:lumMod val="90000"/>
+            </a:schemeClr>
+          </a:solidFill>
+        </p:spPr>
+        <p:style>
+          <a:lnRef idx="2">
+            <a:schemeClr val="accent1">
+              <a:shade val="50000"/>
+            </a:schemeClr>
+          </a:lnRef>
+          <a:fillRef idx="1">
+            <a:schemeClr val="accent1"/>
+          </a:fillRef>
+          <a:effectRef idx="0">
+            <a:schemeClr val="accent1"/>
+          </a:effectRef>
+          <a:fontRef idx="minor">
+            <a:schemeClr val="lt1"/>
+          </a:fontRef>
+        </p:style>
+        <p:txBody>
+          <a:bodyPr rtlCol="0" anchor="ctr"/>
+          <a:lstStyle/>
+          <a:p>
+            <a:pPr algn="ctr"/>
+            <a:r>
+              <a:rPr lang="fr-FR" sz="900" dirty="0">
+                <a:solidFill>
+                  <a:schemeClr val="tx1"/>
+                </a:solidFill>
+              </a:rPr>
+              <a:t>A3</a:t>
+            </a:r>
+          </a:p>
+        </p:txBody>
+      </p:sp>
+      <p:sp>
+        <p:nvSpPr>
+          <p:cNvPr id="158" name="Rectangle 157">
+            <a:extLst>
+              <a:ext uri="{FF2B5EF4-FFF2-40B4-BE49-F238E27FC236}">
+                <a16:creationId xmlns:a16="http://schemas.microsoft.com/office/drawing/2014/main" id="{EB329884-2119-4C1F-B60F-6649C6BFD24C}"/>
+              </a:ext>
+            </a:extLst>
+          </p:cNvPr>
+          <p:cNvSpPr/>
+          <p:nvPr/>
+        </p:nvSpPr>
+        <p:spPr>
+          <a:xfrm>
+            <a:off x="3055470" y="5936242"/>
+            <a:ext cx="955048" cy="390849"/>
+          </a:xfrm>
+          <a:prstGeom prst="rect">
+            <a:avLst/>
+          </a:prstGeom>
+        </p:spPr>
+        <p:style>
+          <a:lnRef idx="1">
+            <a:schemeClr val="accent4"/>
+          </a:lnRef>
+          <a:fillRef idx="2">
+            <a:schemeClr val="accent4"/>
+          </a:fillRef>
+          <a:effectRef idx="1">
+            <a:schemeClr val="accent4"/>
+          </a:effectRef>
+          <a:fontRef idx="minor">
+            <a:schemeClr val="dk1"/>
+          </a:fontRef>
+        </p:style>
+        <p:txBody>
+          <a:bodyPr rtlCol="0" anchor="t"/>
+          <a:lstStyle/>
+          <a:p>
+            <a:pPr algn="ctr"/>
+            <a:r>
+              <a:rPr lang="fr-FR" sz="1200" dirty="0"/>
+              <a:t>Sound Detector</a:t>
+            </a:r>
+          </a:p>
+          <a:p>
+            <a:pPr algn="ctr"/>
+            <a:endParaRPr lang="fr-FR" dirty="0"/>
+          </a:p>
+        </p:txBody>
+      </p:sp>
+      <p:cxnSp>
+        <p:nvCxnSpPr>
+          <p:cNvPr id="163" name="Connecteur droit avec flèche 162">
+            <a:extLst>
+              <a:ext uri="{FF2B5EF4-FFF2-40B4-BE49-F238E27FC236}">
+                <a16:creationId xmlns:a16="http://schemas.microsoft.com/office/drawing/2014/main" id="{476BBA58-B76E-4D3E-AD8A-6172AD9A0622}"/>
+              </a:ext>
+            </a:extLst>
+          </p:cNvPr>
+          <p:cNvCxnSpPr>
+            <a:cxnSpLocks/>
+          </p:cNvCxnSpPr>
+          <p:nvPr/>
+        </p:nvCxnSpPr>
+        <p:spPr>
+          <a:xfrm>
+            <a:off x="3554243" y="5666710"/>
+            <a:ext cx="0" cy="269532"/>
+          </a:xfrm>
+          <a:prstGeom prst="straightConnector1">
+            <a:avLst/>
+          </a:prstGeom>
+          <a:ln w="38100" cap="flat" cmpd="sng" algn="ctr">
+            <a:solidFill>
+              <a:srgbClr val="0070C0"/>
+            </a:solidFill>
+            <a:prstDash val="solid"/>
+            <a:round/>
+            <a:headEnd type="triangle" w="med" len="med"/>
+            <a:tailEnd type="none" w="med" len="med"/>
+          </a:ln>
+        </p:spPr>
+        <p:style>
+          <a:lnRef idx="0">
+            <a:scrgbClr r="0" g="0" b="0"/>
+          </a:lnRef>
+          <a:fillRef idx="0">
+            <a:scrgbClr r="0" g="0" b="0"/>
+          </a:fillRef>
+          <a:effectRef idx="0">
+            <a:scrgbClr r="0" g="0" b="0"/>
+          </a:effectRef>
+          <a:fontRef idx="minor">
+            <a:schemeClr val="tx1"/>
+          </a:fontRef>
+        </p:style>
+      </p:cxnSp>
+      <p:cxnSp>
+        <p:nvCxnSpPr>
+          <p:cNvPr id="164" name="Connecteur droit 163">
+            <a:extLst>
+              <a:ext uri="{FF2B5EF4-FFF2-40B4-BE49-F238E27FC236}">
+                <a16:creationId xmlns:a16="http://schemas.microsoft.com/office/drawing/2014/main" id="{2EE00829-9734-404E-98F7-0AAC0A5F0DF1}"/>
+              </a:ext>
+            </a:extLst>
+          </p:cNvPr>
+          <p:cNvCxnSpPr>
+            <a:cxnSpLocks/>
+          </p:cNvCxnSpPr>
+          <p:nvPr/>
+        </p:nvCxnSpPr>
+        <p:spPr>
+          <a:xfrm flipV="1">
+            <a:off x="3669640" y="6324595"/>
+            <a:ext cx="0" cy="405781"/>
+          </a:xfrm>
+          <a:prstGeom prst="line">
+            <a:avLst/>
+          </a:prstGeom>
+          <a:ln w="19050">
+            <a:solidFill>
+              <a:schemeClr val="tx1"/>
+            </a:solidFill>
+          </a:ln>
+        </p:spPr>
+        <p:style>
+          <a:lnRef idx="1">
+            <a:schemeClr val="accent1"/>
+          </a:lnRef>
+          <a:fillRef idx="0">
+            <a:schemeClr val="accent1"/>
+          </a:fillRef>
+          <a:effectRef idx="0">
+            <a:schemeClr val="accent1"/>
+          </a:effectRef>
+          <a:fontRef idx="minor">
+            <a:schemeClr val="tx1"/>
+          </a:fontRef>
+        </p:style>
+      </p:cxnSp>
+      <p:cxnSp>
+        <p:nvCxnSpPr>
+          <p:cNvPr id="168" name="Connecteur droit 167">
+            <a:extLst>
+              <a:ext uri="{FF2B5EF4-FFF2-40B4-BE49-F238E27FC236}">
+                <a16:creationId xmlns:a16="http://schemas.microsoft.com/office/drawing/2014/main" id="{E280CB5D-8E5A-4C30-869A-E6B7974C8491}"/>
+              </a:ext>
+            </a:extLst>
+          </p:cNvPr>
+          <p:cNvCxnSpPr/>
+          <p:nvPr/>
+        </p:nvCxnSpPr>
+        <p:spPr>
+          <a:xfrm flipV="1">
+            <a:off x="3477155" y="6341142"/>
+            <a:ext cx="0" cy="291876"/>
+          </a:xfrm>
+          <a:prstGeom prst="line">
+            <a:avLst/>
+          </a:prstGeom>
+          <a:ln w="19050">
+            <a:solidFill>
+              <a:srgbClr val="FF0000"/>
+            </a:solidFill>
+          </a:ln>
+        </p:spPr>
+        <p:style>
+          <a:lnRef idx="1">
+            <a:schemeClr val="accent1"/>
+          </a:lnRef>
+          <a:fillRef idx="0">
+            <a:schemeClr val="accent1"/>
+          </a:fillRef>
+          <a:effectRef idx="0">
+            <a:schemeClr val="accent1"/>
+          </a:effectRef>
+          <a:fontRef idx="minor">
+            <a:schemeClr val="tx1"/>
+          </a:fontRef>
+        </p:style>
+      </p:cxnSp>
     </p:spTree>
     <p:extLst>
       <p:ext uri="{BB962C8B-B14F-4D97-AF65-F5344CB8AC3E}">

</xml_diff>

<commit_message>
manage deep sleep mode on ESP
</commit_message>
<xml_diff>
--- a/libraries/Diagramm Robot v2.pptx
+++ b/libraries/Diagramm Robot v2.pptx
@@ -267,7 +267,7 @@
           <a:p>
             <a:fld id="{0717AEF8-1597-4679-8926-916E82E12B07}" type="datetimeFigureOut">
               <a:rPr lang="fr-FR" smtClean="0"/>
-              <a:t>20/01/2019</a:t>
+              <a:t>23/01/2019</a:t>
             </a:fld>
             <a:endParaRPr lang="fr-FR"/>
           </a:p>
@@ -465,7 +465,7 @@
           <a:p>
             <a:fld id="{0717AEF8-1597-4679-8926-916E82E12B07}" type="datetimeFigureOut">
               <a:rPr lang="fr-FR" smtClean="0"/>
-              <a:t>20/01/2019</a:t>
+              <a:t>23/01/2019</a:t>
             </a:fld>
             <a:endParaRPr lang="fr-FR"/>
           </a:p>
@@ -673,7 +673,7 @@
           <a:p>
             <a:fld id="{0717AEF8-1597-4679-8926-916E82E12B07}" type="datetimeFigureOut">
               <a:rPr lang="fr-FR" smtClean="0"/>
-              <a:t>20/01/2019</a:t>
+              <a:t>23/01/2019</a:t>
             </a:fld>
             <a:endParaRPr lang="fr-FR"/>
           </a:p>
@@ -871,7 +871,7 @@
           <a:p>
             <a:fld id="{0717AEF8-1597-4679-8926-916E82E12B07}" type="datetimeFigureOut">
               <a:rPr lang="fr-FR" smtClean="0"/>
-              <a:t>20/01/2019</a:t>
+              <a:t>23/01/2019</a:t>
             </a:fld>
             <a:endParaRPr lang="fr-FR"/>
           </a:p>
@@ -1146,7 +1146,7 @@
           <a:p>
             <a:fld id="{0717AEF8-1597-4679-8926-916E82E12B07}" type="datetimeFigureOut">
               <a:rPr lang="fr-FR" smtClean="0"/>
-              <a:t>20/01/2019</a:t>
+              <a:t>23/01/2019</a:t>
             </a:fld>
             <a:endParaRPr lang="fr-FR"/>
           </a:p>
@@ -1411,7 +1411,7 @@
           <a:p>
             <a:fld id="{0717AEF8-1597-4679-8926-916E82E12B07}" type="datetimeFigureOut">
               <a:rPr lang="fr-FR" smtClean="0"/>
-              <a:t>20/01/2019</a:t>
+              <a:t>23/01/2019</a:t>
             </a:fld>
             <a:endParaRPr lang="fr-FR"/>
           </a:p>
@@ -1823,7 +1823,7 @@
           <a:p>
             <a:fld id="{0717AEF8-1597-4679-8926-916E82E12B07}" type="datetimeFigureOut">
               <a:rPr lang="fr-FR" smtClean="0"/>
-              <a:t>20/01/2019</a:t>
+              <a:t>23/01/2019</a:t>
             </a:fld>
             <a:endParaRPr lang="fr-FR"/>
           </a:p>
@@ -1964,7 +1964,7 @@
           <a:p>
             <a:fld id="{0717AEF8-1597-4679-8926-916E82E12B07}" type="datetimeFigureOut">
               <a:rPr lang="fr-FR" smtClean="0"/>
-              <a:t>20/01/2019</a:t>
+              <a:t>23/01/2019</a:t>
             </a:fld>
             <a:endParaRPr lang="fr-FR"/>
           </a:p>
@@ -2077,7 +2077,7 @@
           <a:p>
             <a:fld id="{0717AEF8-1597-4679-8926-916E82E12B07}" type="datetimeFigureOut">
               <a:rPr lang="fr-FR" smtClean="0"/>
-              <a:t>20/01/2019</a:t>
+              <a:t>23/01/2019</a:t>
             </a:fld>
             <a:endParaRPr lang="fr-FR"/>
           </a:p>
@@ -2388,7 +2388,7 @@
           <a:p>
             <a:fld id="{0717AEF8-1597-4679-8926-916E82E12B07}" type="datetimeFigureOut">
               <a:rPr lang="fr-FR" smtClean="0"/>
-              <a:t>20/01/2019</a:t>
+              <a:t>23/01/2019</a:t>
             </a:fld>
             <a:endParaRPr lang="fr-FR"/>
           </a:p>
@@ -2676,7 +2676,7 @@
           <a:p>
             <a:fld id="{0717AEF8-1597-4679-8926-916E82E12B07}" type="datetimeFigureOut">
               <a:rPr lang="fr-FR" smtClean="0"/>
-              <a:t>20/01/2019</a:t>
+              <a:t>23/01/2019</a:t>
             </a:fld>
             <a:endParaRPr lang="fr-FR"/>
           </a:p>
@@ -2917,7 +2917,7 @@
           <a:p>
             <a:fld id="{0717AEF8-1597-4679-8926-916E82E12B07}" type="datetimeFigureOut">
               <a:rPr lang="fr-FR" smtClean="0"/>
-              <a:t>20/01/2019</a:t>
+              <a:t>23/01/2019</a:t>
             </a:fld>
             <a:endParaRPr lang="fr-FR"/>
           </a:p>
@@ -6435,6 +6435,163 @@
           </a:fontRef>
         </p:style>
       </p:cxnSp>
+      <p:sp>
+        <p:nvSpPr>
+          <p:cNvPr id="89" name="Ellipse 88">
+            <a:extLst>
+              <a:ext uri="{FF2B5EF4-FFF2-40B4-BE49-F238E27FC236}">
+                <a16:creationId xmlns:a16="http://schemas.microsoft.com/office/drawing/2014/main" id="{29A2AEED-4115-40C7-A841-AF24B15AB343}"/>
+              </a:ext>
+            </a:extLst>
+          </p:cNvPr>
+          <p:cNvSpPr/>
+          <p:nvPr/>
+        </p:nvSpPr>
+        <p:spPr>
+          <a:xfrm>
+            <a:off x="7033000" y="4058162"/>
+            <a:ext cx="594107" cy="416421"/>
+          </a:xfrm>
+          <a:prstGeom prst="ellipse">
+            <a:avLst/>
+          </a:prstGeom>
+          <a:solidFill>
+            <a:schemeClr val="bg2">
+              <a:lumMod val="90000"/>
+            </a:schemeClr>
+          </a:solidFill>
+        </p:spPr>
+        <p:style>
+          <a:lnRef idx="2">
+            <a:schemeClr val="accent1">
+              <a:shade val="50000"/>
+            </a:schemeClr>
+          </a:lnRef>
+          <a:fillRef idx="1">
+            <a:schemeClr val="accent1"/>
+          </a:fillRef>
+          <a:effectRef idx="0">
+            <a:schemeClr val="accent1"/>
+          </a:effectRef>
+          <a:fontRef idx="minor">
+            <a:schemeClr val="lt1"/>
+          </a:fontRef>
+        </p:style>
+        <p:txBody>
+          <a:bodyPr rtlCol="0" anchor="ctr"/>
+          <a:lstStyle/>
+          <a:p>
+            <a:pPr algn="ctr"/>
+            <a:r>
+              <a:rPr lang="fr-FR" sz="900" dirty="0"/>
+              <a:t>36</a:t>
+            </a:r>
+          </a:p>
+        </p:txBody>
+      </p:sp>
+      <p:sp>
+        <p:nvSpPr>
+          <p:cNvPr id="93" name="Ellipse 92">
+            <a:extLst>
+              <a:ext uri="{FF2B5EF4-FFF2-40B4-BE49-F238E27FC236}">
+                <a16:creationId xmlns:a16="http://schemas.microsoft.com/office/drawing/2014/main" id="{D56FC545-5DE1-459C-BFBF-A5794193E5EF}"/>
+              </a:ext>
+            </a:extLst>
+          </p:cNvPr>
+          <p:cNvSpPr/>
+          <p:nvPr/>
+        </p:nvSpPr>
+        <p:spPr>
+          <a:xfrm>
+            <a:off x="7050760" y="5044639"/>
+            <a:ext cx="536619" cy="416420"/>
+          </a:xfrm>
+          <a:prstGeom prst="ellipse">
+            <a:avLst/>
+          </a:prstGeom>
+          <a:solidFill>
+            <a:schemeClr val="bg2">
+              <a:lumMod val="90000"/>
+            </a:schemeClr>
+          </a:solidFill>
+        </p:spPr>
+        <p:style>
+          <a:lnRef idx="2">
+            <a:schemeClr val="accent1">
+              <a:shade val="50000"/>
+            </a:schemeClr>
+          </a:lnRef>
+          <a:fillRef idx="1">
+            <a:schemeClr val="accent1"/>
+          </a:fillRef>
+          <a:effectRef idx="0">
+            <a:schemeClr val="accent1"/>
+          </a:effectRef>
+          <a:fontRef idx="minor">
+            <a:schemeClr val="lt1"/>
+          </a:fontRef>
+        </p:style>
+        <p:txBody>
+          <a:bodyPr rtlCol="0" anchor="ctr"/>
+          <a:lstStyle/>
+          <a:p>
+            <a:pPr algn="ctr"/>
+            <a:r>
+              <a:rPr lang="fr-FR" sz="900" dirty="0"/>
+              <a:t>DTR / RST</a:t>
+            </a:r>
+          </a:p>
+        </p:txBody>
+      </p:sp>
+      <p:cxnSp>
+        <p:nvCxnSpPr>
+          <p:cNvPr id="94" name="Connecteur droit avec flèche 93">
+            <a:extLst>
+              <a:ext uri="{FF2B5EF4-FFF2-40B4-BE49-F238E27FC236}">
+                <a16:creationId xmlns:a16="http://schemas.microsoft.com/office/drawing/2014/main" id="{2FA5F74A-46A4-43C6-A76A-DB1881CA592C}"/>
+              </a:ext>
+            </a:extLst>
+          </p:cNvPr>
+          <p:cNvCxnSpPr>
+            <a:cxnSpLocks/>
+            <a:stCxn id="89" idx="4"/>
+            <a:endCxn id="93" idx="0"/>
+          </p:cNvCxnSpPr>
+          <p:nvPr/>
+        </p:nvCxnSpPr>
+        <p:spPr>
+          <a:xfrm flipH="1">
+            <a:off x="7319070" y="4474583"/>
+            <a:ext cx="10984" cy="570056"/>
+          </a:xfrm>
+          <a:prstGeom prst="straightConnector1">
+            <a:avLst/>
+          </a:prstGeom>
+          <a:ln w="38100" cap="flat" cmpd="sng" algn="ctr">
+            <a:solidFill>
+              <a:srgbClr val="FFFF00"/>
+            </a:solidFill>
+            <a:prstDash val="solid"/>
+            <a:round/>
+            <a:headEnd type="none" w="med" len="med"/>
+            <a:tailEnd type="triangle" w="med" len="med"/>
+          </a:ln>
+        </p:spPr>
+        <p:style>
+          <a:lnRef idx="0">
+            <a:scrgbClr r="0" g="0" b="0"/>
+          </a:lnRef>
+          <a:fillRef idx="0">
+            <a:scrgbClr r="0" g="0" b="0"/>
+          </a:fillRef>
+          <a:effectRef idx="0">
+            <a:scrgbClr r="0" g="0" b="0"/>
+          </a:effectRef>
+          <a:fontRef idx="minor">
+            <a:schemeClr val="tx1"/>
+          </a:fontRef>
+        </p:style>
+      </p:cxnSp>
     </p:spTree>
     <p:extLst>
       <p:ext uri="{BB962C8B-B14F-4D97-AF65-F5344CB8AC3E}">
@@ -6479,7 +6636,7 @@
         </p:nvSpPr>
         <p:spPr>
           <a:xfrm>
-            <a:off x="215730" y="1916126"/>
+            <a:off x="215730" y="1907248"/>
             <a:ext cx="9453251" cy="3972742"/>
           </a:xfrm>
           <a:prstGeom prst="rect">
@@ -6530,7 +6687,7 @@
         </p:nvCxnSpPr>
         <p:spPr>
           <a:xfrm flipH="1">
-            <a:off x="4405143" y="1099179"/>
+            <a:off x="5008077" y="1097388"/>
             <a:ext cx="5342" cy="508151"/>
           </a:xfrm>
           <a:prstGeom prst="straightConnector1">
@@ -6578,7 +6735,7 @@
         </p:nvCxnSpPr>
         <p:spPr>
           <a:xfrm>
-            <a:off x="6853898" y="1101839"/>
+            <a:off x="7228232" y="1100048"/>
             <a:ext cx="1" cy="523424"/>
           </a:xfrm>
           <a:prstGeom prst="straightConnector1">
@@ -6625,7 +6782,7 @@
         </p:nvCxnSpPr>
         <p:spPr>
           <a:xfrm flipH="1">
-            <a:off x="3505508" y="1139649"/>
+            <a:off x="3281771" y="1139649"/>
             <a:ext cx="5765" cy="492554"/>
           </a:xfrm>
           <a:prstGeom prst="straightConnector1">
@@ -6670,7 +6827,7 @@
         </p:nvSpPr>
         <p:spPr>
           <a:xfrm>
-            <a:off x="6136671" y="1907808"/>
+            <a:off x="6511005" y="1906017"/>
             <a:ext cx="880291" cy="276999"/>
           </a:xfrm>
           <a:prstGeom prst="rect">
@@ -6885,7 +7042,7 @@
         </p:nvSpPr>
         <p:spPr>
           <a:xfrm>
-            <a:off x="6608494" y="1625263"/>
+            <a:off x="6982828" y="1623472"/>
             <a:ext cx="490809" cy="286308"/>
           </a:xfrm>
           <a:prstGeom prst="ellipse">
@@ -6954,7 +7111,7 @@
         </p:nvSpPr>
         <p:spPr>
           <a:xfrm>
-            <a:off x="6034157" y="1618730"/>
+            <a:off x="6408491" y="1616939"/>
             <a:ext cx="490809" cy="286308"/>
           </a:xfrm>
           <a:prstGeom prst="ellipse">
@@ -7710,8 +7867,8 @@
         </p:nvSpPr>
         <p:spPr>
           <a:xfrm>
-            <a:off x="9365035" y="1921847"/>
-            <a:ext cx="279420" cy="2308324"/>
+            <a:off x="9399378" y="1921847"/>
+            <a:ext cx="281515" cy="2123658"/>
           </a:xfrm>
           <a:prstGeom prst="rect">
             <a:avLst/>
@@ -7747,10 +7904,9 @@
           <a:p>
             <a:pPr algn="ctr"/>
             <a:r>
-              <a:rPr lang="fr-FR" sz="1200" dirty="0" err="1"/>
-              <a:t>tal</a:t>
-            </a:r>
-            <a:endParaRPr lang="fr-FR" sz="1200" dirty="0"/>
+              <a:rPr lang="fr-FR" sz="1200" dirty="0"/>
+              <a:t>Tal</a:t>
+            </a:r>
           </a:p>
           <a:p>
             <a:pPr algn="ctr"/>
@@ -7758,10 +7914,6 @@
           </a:p>
           <a:p>
             <a:pPr algn="ctr"/>
-            <a:endParaRPr lang="fr-FR" sz="1200" dirty="0"/>
-          </a:p>
-          <a:p>
-            <a:pPr algn="ctr"/>
             <a:r>
               <a:rPr lang="fr-FR" sz="1200" dirty="0"/>
               <a:t> </a:t>
@@ -7783,7 +7935,7 @@
         </p:nvSpPr>
         <p:spPr>
           <a:xfrm>
-            <a:off x="4155281" y="1913536"/>
+            <a:off x="4758215" y="1911745"/>
             <a:ext cx="524086" cy="276999"/>
           </a:xfrm>
           <a:prstGeom prst="rect">
@@ -7824,7 +7976,7 @@
         </p:nvSpPr>
         <p:spPr>
           <a:xfrm>
-            <a:off x="4110158" y="1598465"/>
+            <a:off x="4713092" y="1596674"/>
             <a:ext cx="573656" cy="279569"/>
           </a:xfrm>
           <a:prstGeom prst="ellipse">
@@ -8364,7 +8516,7 @@
         </p:nvCxnSpPr>
         <p:spPr>
           <a:xfrm flipH="1">
-            <a:off x="2948837" y="1164112"/>
+            <a:off x="2725100" y="1164112"/>
             <a:ext cx="8230" cy="468246"/>
           </a:xfrm>
           <a:prstGeom prst="straightConnector1">
@@ -8411,7 +8563,7 @@
         </p:nvCxnSpPr>
         <p:spPr>
           <a:xfrm flipH="1">
-            <a:off x="6251811" y="1106134"/>
+            <a:off x="6626145" y="1104343"/>
             <a:ext cx="5765" cy="492554"/>
           </a:xfrm>
           <a:prstGeom prst="straightConnector1">
@@ -8456,7 +8608,7 @@
         </p:nvSpPr>
         <p:spPr>
           <a:xfrm>
-            <a:off x="2691786" y="1916127"/>
+            <a:off x="2468049" y="1916127"/>
             <a:ext cx="1094468" cy="276999"/>
           </a:xfrm>
           <a:prstGeom prst="rect">
@@ -8497,7 +8649,7 @@
         </p:nvSpPr>
         <p:spPr>
           <a:xfrm>
-            <a:off x="3282315" y="1632204"/>
+            <a:off x="3058578" y="1632204"/>
             <a:ext cx="490809" cy="286308"/>
           </a:xfrm>
           <a:prstGeom prst="ellipse">
@@ -8566,7 +8718,7 @@
         </p:nvSpPr>
         <p:spPr>
           <a:xfrm>
-            <a:off x="2708842" y="1625263"/>
+            <a:off x="2485105" y="1625263"/>
             <a:ext cx="490809" cy="286308"/>
           </a:xfrm>
           <a:prstGeom prst="ellipse">
@@ -8695,8 +8847,8 @@
         </p:nvSpPr>
         <p:spPr>
           <a:xfrm>
-            <a:off x="6018901" y="730534"/>
-            <a:ext cx="1109029" cy="390849"/>
+            <a:off x="6429691" y="728743"/>
+            <a:ext cx="1301174" cy="390849"/>
           </a:xfrm>
           <a:prstGeom prst="rect">
             <a:avLst/>
@@ -8727,7 +8879,7 @@
             </a:r>
             <a:r>
               <a:rPr lang="fr-FR" sz="1200" dirty="0" err="1"/>
-              <a:t>WIFIServer</a:t>
+              <a:t>WIFIClient</a:t>
             </a:r>
             <a:endParaRPr lang="fr-FR" sz="1200" dirty="0"/>
           </a:p>
@@ -8945,7 +9097,7 @@
         </p:nvSpPr>
         <p:spPr>
           <a:xfrm>
-            <a:off x="3502163" y="1177599"/>
+            <a:off x="3278426" y="1177599"/>
             <a:ext cx="389850" cy="215444"/>
           </a:xfrm>
           <a:prstGeom prst="rect">
@@ -8983,7 +9135,7 @@
         </p:nvSpPr>
         <p:spPr>
           <a:xfrm>
-            <a:off x="2769234" y="1169859"/>
+            <a:off x="2545497" y="1169859"/>
             <a:ext cx="401072" cy="215444"/>
           </a:xfrm>
           <a:prstGeom prst="rect">
@@ -10732,7 +10884,7 @@
         </p:nvCxnSpPr>
         <p:spPr>
           <a:xfrm flipV="1">
-            <a:off x="3252897" y="91164"/>
+            <a:off x="3155617" y="91164"/>
             <a:ext cx="0" cy="672674"/>
           </a:xfrm>
           <a:prstGeom prst="line">
@@ -10775,7 +10927,7 @@
         </p:nvCxnSpPr>
         <p:spPr>
           <a:xfrm flipV="1">
-            <a:off x="3115904" y="268757"/>
+            <a:off x="2950531" y="268757"/>
             <a:ext cx="0" cy="488154"/>
           </a:xfrm>
           <a:prstGeom prst="line">
@@ -10816,7 +10968,7 @@
         </p:nvSpPr>
         <p:spPr>
           <a:xfrm>
-            <a:off x="2788203" y="764032"/>
+            <a:off x="2564466" y="764032"/>
             <a:ext cx="881437" cy="390849"/>
           </a:xfrm>
           <a:prstGeom prst="rect">
@@ -11967,8 +12119,8 @@
         </p:nvSpPr>
         <p:spPr>
           <a:xfrm>
-            <a:off x="9372846" y="4350109"/>
-            <a:ext cx="294784" cy="646331"/>
+            <a:off x="9365035" y="4124967"/>
+            <a:ext cx="302595" cy="830997"/>
           </a:xfrm>
           <a:prstGeom prst="rect">
             <a:avLst/>
@@ -11988,9 +12140,13 @@
           <a:p>
             <a:pPr algn="ctr"/>
             <a:r>
-              <a:rPr lang="fr-FR" sz="1200" dirty="0"/>
+              <a:rPr lang="fr-FR" sz="1200"/>
               <a:t>PWM</a:t>
             </a:r>
+          </a:p>
+          <a:p>
+            <a:pPr algn="ctr"/>
+            <a:endParaRPr lang="fr-FR" sz="1200" dirty="0"/>
           </a:p>
         </p:txBody>
       </p:sp>
@@ -12729,254 +12885,6 @@
           </a:fontRef>
         </p:style>
       </p:cxnSp>
-      <p:sp>
-        <p:nvSpPr>
-          <p:cNvPr id="152" name="Rectangle 151">
-            <a:extLst>
-              <a:ext uri="{FF2B5EF4-FFF2-40B4-BE49-F238E27FC236}">
-                <a16:creationId xmlns:a16="http://schemas.microsoft.com/office/drawing/2014/main" id="{5700205C-2AE1-4EDC-8ED1-B218F99E7971}"/>
-              </a:ext>
-            </a:extLst>
-          </p:cNvPr>
-          <p:cNvSpPr/>
-          <p:nvPr/>
-        </p:nvSpPr>
-        <p:spPr>
-          <a:xfrm>
-            <a:off x="10316926" y="3575420"/>
-            <a:ext cx="1207065" cy="273425"/>
-          </a:xfrm>
-          <a:prstGeom prst="rect">
-            <a:avLst/>
-          </a:prstGeom>
-        </p:spPr>
-        <p:style>
-          <a:lnRef idx="1">
-            <a:schemeClr val="accent4"/>
-          </a:lnRef>
-          <a:fillRef idx="2">
-            <a:schemeClr val="accent4"/>
-          </a:fillRef>
-          <a:effectRef idx="1">
-            <a:schemeClr val="accent4"/>
-          </a:effectRef>
-          <a:fontRef idx="minor">
-            <a:schemeClr val="dk1"/>
-          </a:fontRef>
-        </p:style>
-        <p:txBody>
-          <a:bodyPr rtlCol="0" anchor="t"/>
-          <a:lstStyle/>
-          <a:p>
-            <a:pPr algn="ctr"/>
-            <a:r>
-              <a:rPr lang="fr-FR" sz="1200" dirty="0"/>
-              <a:t>Motion</a:t>
-            </a:r>
-            <a:r>
-              <a:rPr lang="af-ZA" sz="1200" dirty="0"/>
-              <a:t>SEN0018</a:t>
-            </a:r>
-            <a:endParaRPr lang="fr-FR" sz="1200" dirty="0"/>
-          </a:p>
-          <a:p>
-            <a:pPr algn="ctr"/>
-            <a:endParaRPr lang="fr-FR" dirty="0"/>
-          </a:p>
-        </p:txBody>
-      </p:sp>
-      <p:sp>
-        <p:nvSpPr>
-          <p:cNvPr id="153" name="Ellipse 152">
-            <a:extLst>
-              <a:ext uri="{FF2B5EF4-FFF2-40B4-BE49-F238E27FC236}">
-                <a16:creationId xmlns:a16="http://schemas.microsoft.com/office/drawing/2014/main" id="{2532AA1D-074A-4D6C-A26E-8299CAE75729}"/>
-              </a:ext>
-            </a:extLst>
-          </p:cNvPr>
-          <p:cNvSpPr/>
-          <p:nvPr/>
-        </p:nvSpPr>
-        <p:spPr>
-          <a:xfrm>
-            <a:off x="9680578" y="3604237"/>
-            <a:ext cx="479833" cy="220039"/>
-          </a:xfrm>
-          <a:prstGeom prst="ellipse">
-            <a:avLst/>
-          </a:prstGeom>
-          <a:solidFill>
-            <a:schemeClr val="bg2">
-              <a:lumMod val="90000"/>
-            </a:schemeClr>
-          </a:solidFill>
-        </p:spPr>
-        <p:style>
-          <a:lnRef idx="2">
-            <a:schemeClr val="accent1">
-              <a:shade val="50000"/>
-            </a:schemeClr>
-          </a:lnRef>
-          <a:fillRef idx="1">
-            <a:schemeClr val="accent1"/>
-          </a:fillRef>
-          <a:effectRef idx="0">
-            <a:schemeClr val="accent1"/>
-          </a:effectRef>
-          <a:fontRef idx="minor">
-            <a:schemeClr val="lt1"/>
-          </a:fontRef>
-        </p:style>
-        <p:txBody>
-          <a:bodyPr rtlCol="0" anchor="ctr"/>
-          <a:lstStyle/>
-          <a:p>
-            <a:pPr algn="ctr"/>
-            <a:r>
-              <a:rPr lang="fr-FR" sz="900" dirty="0">
-                <a:solidFill>
-                  <a:schemeClr val="tx1"/>
-                </a:solidFill>
-              </a:rPr>
-              <a:t>28</a:t>
-            </a:r>
-          </a:p>
-        </p:txBody>
-      </p:sp>
-      <p:cxnSp>
-        <p:nvCxnSpPr>
-          <p:cNvPr id="154" name="Connecteur : en angle 153">
-            <a:extLst>
-              <a:ext uri="{FF2B5EF4-FFF2-40B4-BE49-F238E27FC236}">
-                <a16:creationId xmlns:a16="http://schemas.microsoft.com/office/drawing/2014/main" id="{FB79B680-35BC-43FA-AA85-A4E2BDBFDE78}"/>
-              </a:ext>
-            </a:extLst>
-          </p:cNvPr>
-          <p:cNvCxnSpPr>
-            <a:cxnSpLocks/>
-            <a:stCxn id="153" idx="6"/>
-            <a:endCxn id="152" idx="1"/>
-          </p:cNvCxnSpPr>
-          <p:nvPr/>
-        </p:nvCxnSpPr>
-        <p:spPr>
-          <a:xfrm flipV="1">
-            <a:off x="10160411" y="3712133"/>
-            <a:ext cx="156515" cy="2124"/>
-          </a:xfrm>
-          <a:prstGeom prst="bentConnector3">
-            <a:avLst>
-              <a:gd name="adj1" fmla="val 50000"/>
-            </a:avLst>
-          </a:prstGeom>
-          <a:ln w="19050">
-            <a:solidFill>
-              <a:srgbClr val="00B050"/>
-            </a:solidFill>
-            <a:tailEnd type="triangle"/>
-          </a:ln>
-        </p:spPr>
-        <p:style>
-          <a:lnRef idx="1">
-            <a:schemeClr val="accent1"/>
-          </a:lnRef>
-          <a:fillRef idx="0">
-            <a:schemeClr val="accent1"/>
-          </a:fillRef>
-          <a:effectRef idx="0">
-            <a:schemeClr val="accent1"/>
-          </a:effectRef>
-          <a:fontRef idx="minor">
-            <a:schemeClr val="tx1"/>
-          </a:fontRef>
-        </p:style>
-      </p:cxnSp>
-      <p:cxnSp>
-        <p:nvCxnSpPr>
-          <p:cNvPr id="155" name="Connecteur droit 154">
-            <a:extLst>
-              <a:ext uri="{FF2B5EF4-FFF2-40B4-BE49-F238E27FC236}">
-                <a16:creationId xmlns:a16="http://schemas.microsoft.com/office/drawing/2014/main" id="{39945714-179F-4178-91BF-5CB8D4A22835}"/>
-              </a:ext>
-            </a:extLst>
-          </p:cNvPr>
-          <p:cNvCxnSpPr>
-            <a:cxnSpLocks/>
-          </p:cNvCxnSpPr>
-          <p:nvPr/>
-        </p:nvCxnSpPr>
-        <p:spPr>
-          <a:xfrm flipV="1">
-            <a:off x="11523991" y="3668262"/>
-            <a:ext cx="229670" cy="1"/>
-          </a:xfrm>
-          <a:prstGeom prst="line">
-            <a:avLst/>
-          </a:prstGeom>
-          <a:ln w="19050">
-            <a:solidFill>
-              <a:schemeClr val="tx1"/>
-            </a:solidFill>
-          </a:ln>
-        </p:spPr>
-        <p:style>
-          <a:lnRef idx="1">
-            <a:schemeClr val="accent1"/>
-          </a:lnRef>
-          <a:fillRef idx="0">
-            <a:schemeClr val="accent1"/>
-          </a:fillRef>
-          <a:effectRef idx="0">
-            <a:schemeClr val="accent1"/>
-          </a:effectRef>
-          <a:fontRef idx="minor">
-            <a:schemeClr val="tx1"/>
-          </a:fontRef>
-        </p:style>
-      </p:cxnSp>
-      <p:cxnSp>
-        <p:nvCxnSpPr>
-          <p:cNvPr id="156" name="Connecteur droit 155">
-            <a:extLst>
-              <a:ext uri="{FF2B5EF4-FFF2-40B4-BE49-F238E27FC236}">
-                <a16:creationId xmlns:a16="http://schemas.microsoft.com/office/drawing/2014/main" id="{E6CE3DB1-F532-4E46-8102-9BC104159647}"/>
-              </a:ext>
-            </a:extLst>
-          </p:cNvPr>
-          <p:cNvCxnSpPr>
-            <a:cxnSpLocks/>
-          </p:cNvCxnSpPr>
-          <p:nvPr/>
-        </p:nvCxnSpPr>
-        <p:spPr>
-          <a:xfrm>
-            <a:off x="11523991" y="3765679"/>
-            <a:ext cx="478212" cy="3940"/>
-          </a:xfrm>
-          <a:prstGeom prst="line">
-            <a:avLst/>
-          </a:prstGeom>
-          <a:ln w="19050">
-            <a:solidFill>
-              <a:srgbClr val="FF0000"/>
-            </a:solidFill>
-          </a:ln>
-        </p:spPr>
-        <p:style>
-          <a:lnRef idx="1">
-            <a:schemeClr val="accent1"/>
-          </a:lnRef>
-          <a:fillRef idx="0">
-            <a:schemeClr val="accent1"/>
-          </a:fillRef>
-          <a:effectRef idx="0">
-            <a:schemeClr val="accent1"/>
-          </a:effectRef>
-          <a:fontRef idx="minor">
-            <a:schemeClr val="tx1"/>
-          </a:fontRef>
-        </p:style>
-      </p:cxnSp>
       <p:cxnSp>
         <p:nvCxnSpPr>
           <p:cNvPr id="159" name="Connecteur droit avec flèche 158">
@@ -12994,7 +12902,7 @@
         </p:nvCxnSpPr>
         <p:spPr>
           <a:xfrm>
-            <a:off x="5498164" y="1119466"/>
+            <a:off x="6101098" y="1117675"/>
             <a:ext cx="1" cy="523424"/>
           </a:xfrm>
           <a:prstGeom prst="straightConnector1">
@@ -13039,7 +12947,7 @@
         </p:nvSpPr>
         <p:spPr>
           <a:xfrm>
-            <a:off x="4831602" y="1905248"/>
+            <a:off x="5434536" y="1903457"/>
             <a:ext cx="880291" cy="276999"/>
           </a:xfrm>
           <a:prstGeom prst="rect">
@@ -13080,7 +12988,7 @@
         </p:nvSpPr>
         <p:spPr>
           <a:xfrm>
-            <a:off x="5252760" y="1642890"/>
+            <a:off x="5855694" y="1641099"/>
             <a:ext cx="490809" cy="286308"/>
           </a:xfrm>
           <a:prstGeom prst="ellipse">
@@ -13149,7 +13057,7 @@
         </p:nvSpPr>
         <p:spPr>
           <a:xfrm>
-            <a:off x="4717334" y="1608329"/>
+            <a:off x="5320268" y="1606538"/>
             <a:ext cx="490809" cy="286308"/>
           </a:xfrm>
           <a:prstGeom prst="ellipse">
@@ -13220,7 +13128,7 @@
         </p:nvCxnSpPr>
         <p:spPr>
           <a:xfrm flipH="1">
-            <a:off x="4986043" y="1098092"/>
+            <a:off x="5588977" y="1096301"/>
             <a:ext cx="5765" cy="492554"/>
           </a:xfrm>
           <a:prstGeom prst="straightConnector1">
@@ -13265,7 +13173,7 @@
         </p:nvSpPr>
         <p:spPr>
           <a:xfrm>
-            <a:off x="4063089" y="738997"/>
+            <a:off x="4666023" y="737206"/>
             <a:ext cx="1694051" cy="390849"/>
           </a:xfrm>
           <a:prstGeom prst="rect">
@@ -13367,7 +13275,7 @@
         </p:nvSpPr>
         <p:spPr>
           <a:xfrm>
-            <a:off x="10309524" y="3860990"/>
+            <a:off x="10309524" y="3596256"/>
             <a:ext cx="1207065" cy="273425"/>
           </a:xfrm>
           <a:prstGeom prst="rect">
@@ -13415,7 +13323,7 @@
         </p:nvSpPr>
         <p:spPr>
           <a:xfrm>
-            <a:off x="9673176" y="3889807"/>
+            <a:off x="9673176" y="3625073"/>
             <a:ext cx="479833" cy="220039"/>
           </a:xfrm>
           <a:prstGeom prst="ellipse">
@@ -13477,7 +13385,7 @@
         </p:nvCxnSpPr>
         <p:spPr>
           <a:xfrm flipV="1">
-            <a:off x="10153009" y="3997703"/>
+            <a:off x="10153009" y="3732969"/>
             <a:ext cx="156515" cy="2124"/>
           </a:xfrm>
           <a:prstGeom prst="bentConnector3">
@@ -13487,7 +13395,7 @@
           </a:prstGeom>
           <a:ln w="19050">
             <a:solidFill>
-              <a:schemeClr val="tx1"/>
+              <a:srgbClr val="00B050"/>
             </a:solidFill>
             <a:tailEnd type="triangle"/>
           </a:ln>
@@ -13523,7 +13431,7 @@
         </p:nvCxnSpPr>
         <p:spPr>
           <a:xfrm flipV="1">
-            <a:off x="11516589" y="3953832"/>
+            <a:off x="11516589" y="3689098"/>
             <a:ext cx="229670" cy="1"/>
           </a:xfrm>
           <a:prstGeom prst="line">
@@ -13566,7 +13474,7 @@
         </p:nvCxnSpPr>
         <p:spPr>
           <a:xfrm>
-            <a:off x="11516589" y="4051249"/>
+            <a:off x="11516589" y="3786515"/>
             <a:ext cx="478212" cy="3940"/>
           </a:xfrm>
           <a:prstGeom prst="line">
@@ -14390,6 +14298,534 @@
           </a:fontRef>
         </p:style>
       </p:cxnSp>
+      <p:cxnSp>
+        <p:nvCxnSpPr>
+          <p:cNvPr id="168" name="Connecteur droit avec flèche 167">
+            <a:extLst>
+              <a:ext uri="{FF2B5EF4-FFF2-40B4-BE49-F238E27FC236}">
+                <a16:creationId xmlns:a16="http://schemas.microsoft.com/office/drawing/2014/main" id="{C43B6E4F-92BE-47C3-A642-98CC7980C9F9}"/>
+              </a:ext>
+            </a:extLst>
+          </p:cNvPr>
+          <p:cNvCxnSpPr>
+            <a:cxnSpLocks/>
+          </p:cNvCxnSpPr>
+          <p:nvPr/>
+        </p:nvCxnSpPr>
+        <p:spPr>
+          <a:xfrm flipH="1">
+            <a:off x="4177165" y="1113544"/>
+            <a:ext cx="5342" cy="508151"/>
+          </a:xfrm>
+          <a:prstGeom prst="straightConnector1">
+            <a:avLst/>
+          </a:prstGeom>
+          <a:ln w="38100" cap="flat" cmpd="sng" algn="ctr">
+            <a:solidFill>
+              <a:srgbClr val="00B050"/>
+            </a:solidFill>
+            <a:prstDash val="solid"/>
+            <a:round/>
+            <a:headEnd type="none" w="med" len="med"/>
+            <a:tailEnd type="triangle" w="med" len="med"/>
+          </a:ln>
+        </p:spPr>
+        <p:style>
+          <a:lnRef idx="0">
+            <a:scrgbClr r="0" g="0" b="0"/>
+          </a:lnRef>
+          <a:fillRef idx="0">
+            <a:scrgbClr r="0" g="0" b="0"/>
+          </a:fillRef>
+          <a:effectRef idx="0">
+            <a:scrgbClr r="0" g="0" b="0"/>
+          </a:effectRef>
+          <a:fontRef idx="minor">
+            <a:schemeClr val="tx1"/>
+          </a:fontRef>
+        </p:style>
+      </p:cxnSp>
+      <p:sp>
+        <p:nvSpPr>
+          <p:cNvPr id="211" name="Rectangle 210">
+            <a:extLst>
+              <a:ext uri="{FF2B5EF4-FFF2-40B4-BE49-F238E27FC236}">
+                <a16:creationId xmlns:a16="http://schemas.microsoft.com/office/drawing/2014/main" id="{4528C32F-1FA5-43DF-992B-576426DDC041}"/>
+              </a:ext>
+            </a:extLst>
+          </p:cNvPr>
+          <p:cNvSpPr/>
+          <p:nvPr/>
+        </p:nvSpPr>
+        <p:spPr>
+          <a:xfrm>
+            <a:off x="3926955" y="1925690"/>
+            <a:ext cx="524086" cy="276999"/>
+          </a:xfrm>
+          <a:prstGeom prst="rect">
+            <a:avLst/>
+          </a:prstGeom>
+          <a:solidFill>
+            <a:schemeClr val="accent2">
+              <a:lumMod val="60000"/>
+              <a:lumOff val="40000"/>
+            </a:schemeClr>
+          </a:solidFill>
+        </p:spPr>
+        <p:txBody>
+          <a:bodyPr wrap="square">
+            <a:spAutoFit/>
+          </a:bodyPr>
+          <a:lstStyle/>
+          <a:p>
+            <a:pPr algn="ctr"/>
+            <a:r>
+              <a:rPr lang="fr-FR" sz="1200" dirty="0"/>
+              <a:t>Int 0</a:t>
+            </a:r>
+          </a:p>
+        </p:txBody>
+      </p:sp>
+      <p:sp>
+        <p:nvSpPr>
+          <p:cNvPr id="218" name="Ellipse 217">
+            <a:extLst>
+              <a:ext uri="{FF2B5EF4-FFF2-40B4-BE49-F238E27FC236}">
+                <a16:creationId xmlns:a16="http://schemas.microsoft.com/office/drawing/2014/main" id="{75B1A509-D7BC-4E8E-899B-A08EE21C22FA}"/>
+              </a:ext>
+            </a:extLst>
+          </p:cNvPr>
+          <p:cNvSpPr/>
+          <p:nvPr/>
+        </p:nvSpPr>
+        <p:spPr>
+          <a:xfrm>
+            <a:off x="3881167" y="1615267"/>
+            <a:ext cx="573656" cy="279569"/>
+          </a:xfrm>
+          <a:prstGeom prst="ellipse">
+            <a:avLst/>
+          </a:prstGeom>
+          <a:solidFill>
+            <a:schemeClr val="bg2">
+              <a:lumMod val="90000"/>
+            </a:schemeClr>
+          </a:solidFill>
+        </p:spPr>
+        <p:style>
+          <a:lnRef idx="2">
+            <a:schemeClr val="accent1">
+              <a:shade val="50000"/>
+            </a:schemeClr>
+          </a:lnRef>
+          <a:fillRef idx="1">
+            <a:schemeClr val="accent1"/>
+          </a:fillRef>
+          <a:effectRef idx="0">
+            <a:schemeClr val="accent1"/>
+          </a:effectRef>
+          <a:fontRef idx="minor">
+            <a:schemeClr val="lt1"/>
+          </a:fontRef>
+        </p:style>
+        <p:txBody>
+          <a:bodyPr rtlCol="0" anchor="ctr"/>
+          <a:lstStyle/>
+          <a:p>
+            <a:pPr algn="ctr"/>
+            <a:r>
+              <a:rPr lang="fr-FR" sz="900" dirty="0">
+                <a:solidFill>
+                  <a:schemeClr val="tx1"/>
+                </a:solidFill>
+              </a:rPr>
+              <a:t>2</a:t>
+            </a:r>
+          </a:p>
+          <a:p>
+            <a:pPr algn="ctr"/>
+            <a:r>
+              <a:rPr lang="fr-FR" sz="900" dirty="0">
+                <a:solidFill>
+                  <a:schemeClr val="tx1"/>
+                </a:solidFill>
+              </a:rPr>
+              <a:t>Int0</a:t>
+            </a:r>
+          </a:p>
+        </p:txBody>
+      </p:sp>
+      <p:sp>
+        <p:nvSpPr>
+          <p:cNvPr id="219" name="Rectangle 218">
+            <a:extLst>
+              <a:ext uri="{FF2B5EF4-FFF2-40B4-BE49-F238E27FC236}">
+                <a16:creationId xmlns:a16="http://schemas.microsoft.com/office/drawing/2014/main" id="{87E757E5-F0C7-467D-907D-4527810FD7E3}"/>
+              </a:ext>
+            </a:extLst>
+          </p:cNvPr>
+          <p:cNvSpPr/>
+          <p:nvPr/>
+        </p:nvSpPr>
+        <p:spPr>
+          <a:xfrm>
+            <a:off x="3699075" y="742505"/>
+            <a:ext cx="881437" cy="390849"/>
+          </a:xfrm>
+          <a:prstGeom prst="rect">
+            <a:avLst/>
+          </a:prstGeom>
+        </p:spPr>
+        <p:style>
+          <a:lnRef idx="1">
+            <a:schemeClr val="accent4"/>
+          </a:lnRef>
+          <a:fillRef idx="2">
+            <a:schemeClr val="accent4"/>
+          </a:fillRef>
+          <a:effectRef idx="1">
+            <a:schemeClr val="accent4"/>
+          </a:effectRef>
+          <a:fontRef idx="minor">
+            <a:schemeClr val="dk1"/>
+          </a:fontRef>
+        </p:style>
+        <p:txBody>
+          <a:bodyPr rtlCol="0" anchor="t"/>
+          <a:lstStyle/>
+          <a:p>
+            <a:pPr algn="ctr"/>
+            <a:r>
+              <a:rPr lang="fr-FR" sz="1200" dirty="0"/>
+              <a:t>Motion</a:t>
+            </a:r>
+          </a:p>
+          <a:p>
+            <a:pPr algn="ctr"/>
+            <a:r>
+              <a:rPr lang="af-ZA" sz="1200" dirty="0"/>
+              <a:t>SEN0018</a:t>
+            </a:r>
+            <a:endParaRPr lang="fr-FR" sz="1200" dirty="0"/>
+          </a:p>
+        </p:txBody>
+      </p:sp>
+      <p:cxnSp>
+        <p:nvCxnSpPr>
+          <p:cNvPr id="220" name="Connecteur droit 219">
+            <a:extLst>
+              <a:ext uri="{FF2B5EF4-FFF2-40B4-BE49-F238E27FC236}">
+                <a16:creationId xmlns:a16="http://schemas.microsoft.com/office/drawing/2014/main" id="{5C325E3F-F365-4428-B465-3A41B2014821}"/>
+              </a:ext>
+            </a:extLst>
+          </p:cNvPr>
+          <p:cNvCxnSpPr>
+            <a:cxnSpLocks/>
+          </p:cNvCxnSpPr>
+          <p:nvPr/>
+        </p:nvCxnSpPr>
+        <p:spPr>
+          <a:xfrm flipV="1">
+            <a:off x="3973457" y="257029"/>
+            <a:ext cx="0" cy="488154"/>
+          </a:xfrm>
+          <a:prstGeom prst="line">
+            <a:avLst/>
+          </a:prstGeom>
+          <a:ln w="19050">
+            <a:solidFill>
+              <a:schemeClr val="tx1"/>
+            </a:solidFill>
+          </a:ln>
+        </p:spPr>
+        <p:style>
+          <a:lnRef idx="1">
+            <a:schemeClr val="accent1"/>
+          </a:lnRef>
+          <a:fillRef idx="0">
+            <a:schemeClr val="accent1"/>
+          </a:fillRef>
+          <a:effectRef idx="0">
+            <a:schemeClr val="accent1"/>
+          </a:effectRef>
+          <a:fontRef idx="minor">
+            <a:schemeClr val="tx1"/>
+          </a:fontRef>
+        </p:style>
+      </p:cxnSp>
+      <p:cxnSp>
+        <p:nvCxnSpPr>
+          <p:cNvPr id="221" name="Connecteur droit 220">
+            <a:extLst>
+              <a:ext uri="{FF2B5EF4-FFF2-40B4-BE49-F238E27FC236}">
+                <a16:creationId xmlns:a16="http://schemas.microsoft.com/office/drawing/2014/main" id="{4C530E5C-D5DA-49FF-BC33-63EAC83BBEC5}"/>
+              </a:ext>
+            </a:extLst>
+          </p:cNvPr>
+          <p:cNvCxnSpPr>
+            <a:cxnSpLocks/>
+          </p:cNvCxnSpPr>
+          <p:nvPr/>
+        </p:nvCxnSpPr>
+        <p:spPr>
+          <a:xfrm flipV="1">
+            <a:off x="5321019" y="268757"/>
+            <a:ext cx="0" cy="459986"/>
+          </a:xfrm>
+          <a:prstGeom prst="line">
+            <a:avLst/>
+          </a:prstGeom>
+          <a:ln w="19050">
+            <a:solidFill>
+              <a:schemeClr val="tx1"/>
+            </a:solidFill>
+          </a:ln>
+        </p:spPr>
+        <p:style>
+          <a:lnRef idx="1">
+            <a:schemeClr val="accent1"/>
+          </a:lnRef>
+          <a:fillRef idx="0">
+            <a:schemeClr val="accent1"/>
+          </a:fillRef>
+          <a:effectRef idx="0">
+            <a:schemeClr val="accent1"/>
+          </a:effectRef>
+          <a:fontRef idx="minor">
+            <a:schemeClr val="tx1"/>
+          </a:fontRef>
+        </p:style>
+      </p:cxnSp>
+      <p:cxnSp>
+        <p:nvCxnSpPr>
+          <p:cNvPr id="222" name="Connecteur droit 221">
+            <a:extLst>
+              <a:ext uri="{FF2B5EF4-FFF2-40B4-BE49-F238E27FC236}">
+                <a16:creationId xmlns:a16="http://schemas.microsoft.com/office/drawing/2014/main" id="{A9B2751E-18F9-4215-BE3B-FDD0DC5C3743}"/>
+              </a:ext>
+            </a:extLst>
+          </p:cNvPr>
+          <p:cNvCxnSpPr>
+            <a:cxnSpLocks/>
+          </p:cNvCxnSpPr>
+          <p:nvPr/>
+        </p:nvCxnSpPr>
+        <p:spPr>
+          <a:xfrm flipH="1" flipV="1">
+            <a:off x="7127708" y="275684"/>
+            <a:ext cx="192" cy="453059"/>
+          </a:xfrm>
+          <a:prstGeom prst="line">
+            <a:avLst/>
+          </a:prstGeom>
+          <a:ln w="19050">
+            <a:solidFill>
+              <a:schemeClr val="tx1"/>
+            </a:solidFill>
+          </a:ln>
+        </p:spPr>
+        <p:style>
+          <a:lnRef idx="1">
+            <a:schemeClr val="accent1"/>
+          </a:lnRef>
+          <a:fillRef idx="0">
+            <a:schemeClr val="accent1"/>
+          </a:fillRef>
+          <a:effectRef idx="0">
+            <a:schemeClr val="accent1"/>
+          </a:effectRef>
+          <a:fontRef idx="minor">
+            <a:schemeClr val="tx1"/>
+          </a:fontRef>
+        </p:style>
+      </p:cxnSp>
+      <p:cxnSp>
+        <p:nvCxnSpPr>
+          <p:cNvPr id="223" name="Connecteur droit 222">
+            <a:extLst>
+              <a:ext uri="{FF2B5EF4-FFF2-40B4-BE49-F238E27FC236}">
+                <a16:creationId xmlns:a16="http://schemas.microsoft.com/office/drawing/2014/main" id="{4B67FA3F-1E15-436B-8BCD-7170B497D627}"/>
+              </a:ext>
+            </a:extLst>
+          </p:cNvPr>
+          <p:cNvCxnSpPr>
+            <a:cxnSpLocks/>
+          </p:cNvCxnSpPr>
+          <p:nvPr/>
+        </p:nvCxnSpPr>
+        <p:spPr>
+          <a:xfrm flipV="1">
+            <a:off x="4130678" y="64718"/>
+            <a:ext cx="0" cy="672674"/>
+          </a:xfrm>
+          <a:prstGeom prst="line">
+            <a:avLst/>
+          </a:prstGeom>
+          <a:ln w="19050">
+            <a:solidFill>
+              <a:srgbClr val="FF0000"/>
+            </a:solidFill>
+          </a:ln>
+        </p:spPr>
+        <p:style>
+          <a:lnRef idx="1">
+            <a:schemeClr val="accent1"/>
+          </a:lnRef>
+          <a:fillRef idx="0">
+            <a:schemeClr val="accent1"/>
+          </a:fillRef>
+          <a:effectRef idx="0">
+            <a:schemeClr val="accent1"/>
+          </a:effectRef>
+          <a:fontRef idx="minor">
+            <a:schemeClr val="tx1"/>
+          </a:fontRef>
+        </p:style>
+      </p:cxnSp>
+      <p:sp>
+        <p:nvSpPr>
+          <p:cNvPr id="224" name="Ellipse 223">
+            <a:extLst>
+              <a:ext uri="{FF2B5EF4-FFF2-40B4-BE49-F238E27FC236}">
+                <a16:creationId xmlns:a16="http://schemas.microsoft.com/office/drawing/2014/main" id="{9E51B75A-75FB-40AC-86CC-C101C9FC18B7}"/>
+              </a:ext>
+            </a:extLst>
+          </p:cNvPr>
+          <p:cNvSpPr/>
+          <p:nvPr/>
+        </p:nvSpPr>
+        <p:spPr>
+          <a:xfrm>
+            <a:off x="8911591" y="3838289"/>
+            <a:ext cx="479833" cy="220039"/>
+          </a:xfrm>
+          <a:prstGeom prst="ellipse">
+            <a:avLst/>
+          </a:prstGeom>
+          <a:solidFill>
+            <a:schemeClr val="bg2">
+              <a:lumMod val="90000"/>
+            </a:schemeClr>
+          </a:solidFill>
+        </p:spPr>
+        <p:style>
+          <a:lnRef idx="2">
+            <a:schemeClr val="accent1">
+              <a:shade val="50000"/>
+            </a:schemeClr>
+          </a:lnRef>
+          <a:fillRef idx="1">
+            <a:schemeClr val="accent1"/>
+          </a:fillRef>
+          <a:effectRef idx="0">
+            <a:schemeClr val="accent1"/>
+          </a:effectRef>
+          <a:fontRef idx="minor">
+            <a:schemeClr val="lt1"/>
+          </a:fontRef>
+        </p:style>
+        <p:txBody>
+          <a:bodyPr rtlCol="0" anchor="ctr"/>
+          <a:lstStyle/>
+          <a:p>
+            <a:pPr algn="ctr"/>
+            <a:r>
+              <a:rPr lang="fr-FR" sz="900" dirty="0">
+                <a:solidFill>
+                  <a:schemeClr val="tx1"/>
+                </a:solidFill>
+              </a:rPr>
+              <a:t>36</a:t>
+            </a:r>
+          </a:p>
+        </p:txBody>
+      </p:sp>
+      <p:cxnSp>
+        <p:nvCxnSpPr>
+          <p:cNvPr id="225" name="Connecteur : en angle 224">
+            <a:extLst>
+              <a:ext uri="{FF2B5EF4-FFF2-40B4-BE49-F238E27FC236}">
+                <a16:creationId xmlns:a16="http://schemas.microsoft.com/office/drawing/2014/main" id="{B89FF9D8-CD62-42D9-90BD-5DB29F288F61}"/>
+              </a:ext>
+            </a:extLst>
+          </p:cNvPr>
+          <p:cNvCxnSpPr>
+            <a:cxnSpLocks/>
+            <a:endCxn id="224" idx="2"/>
+          </p:cNvCxnSpPr>
+          <p:nvPr/>
+        </p:nvCxnSpPr>
+        <p:spPr>
+          <a:xfrm rot="16200000" flipH="1">
+            <a:off x="6799357" y="1836074"/>
+            <a:ext cx="2872839" cy="1351629"/>
+          </a:xfrm>
+          <a:prstGeom prst="bentConnector2">
+            <a:avLst/>
+          </a:prstGeom>
+          <a:ln w="38100" cap="flat" cmpd="sng" algn="ctr">
+            <a:solidFill>
+              <a:srgbClr val="FFFF00"/>
+            </a:solidFill>
+            <a:prstDash val="solid"/>
+            <a:round/>
+            <a:headEnd type="triangle" w="med" len="med"/>
+            <a:tailEnd type="none" w="med" len="med"/>
+          </a:ln>
+        </p:spPr>
+        <p:style>
+          <a:lnRef idx="0">
+            <a:scrgbClr r="0" g="0" b="0"/>
+          </a:lnRef>
+          <a:fillRef idx="0">
+            <a:scrgbClr r="0" g="0" b="0"/>
+          </a:fillRef>
+          <a:effectRef idx="0">
+            <a:scrgbClr r="0" g="0" b="0"/>
+          </a:effectRef>
+          <a:fontRef idx="minor">
+            <a:schemeClr val="tx1"/>
+          </a:fontRef>
+        </p:style>
+      </p:cxnSp>
+      <p:sp>
+        <p:nvSpPr>
+          <p:cNvPr id="226" name="ZoneTexte 225">
+            <a:extLst>
+              <a:ext uri="{FF2B5EF4-FFF2-40B4-BE49-F238E27FC236}">
+                <a16:creationId xmlns:a16="http://schemas.microsoft.com/office/drawing/2014/main" id="{78F758B1-F5B0-45CE-AA47-BD07E2A53DF0}"/>
+              </a:ext>
+            </a:extLst>
+          </p:cNvPr>
+          <p:cNvSpPr txBox="1"/>
+          <p:nvPr/>
+        </p:nvSpPr>
+        <p:spPr>
+          <a:xfrm rot="16200000">
+            <a:off x="7306372" y="1522347"/>
+            <a:ext cx="694067" cy="215444"/>
+          </a:xfrm>
+          <a:prstGeom prst="rect">
+            <a:avLst/>
+          </a:prstGeom>
+          <a:noFill/>
+        </p:spPr>
+        <p:txBody>
+          <a:bodyPr wrap="square" rtlCol="0">
+            <a:spAutoFit/>
+          </a:bodyPr>
+          <a:lstStyle/>
+          <a:p>
+            <a:r>
+              <a:rPr lang="fr-FR" sz="800" dirty="0">
+                <a:latin typeface="Arial" panose="020B0604020202020204" pitchFamily="34" charset="0"/>
+                <a:cs typeface="Arial" panose="020B0604020202020204" pitchFamily="34" charset="0"/>
+              </a:rPr>
+              <a:t>DTR / RST</a:t>
+            </a:r>
+          </a:p>
+        </p:txBody>
+      </p:sp>
     </p:spTree>
     <p:extLst>
       <p:ext uri="{BB962C8B-B14F-4D97-AF65-F5344CB8AC3E}">
@@ -19366,7 +19802,7 @@
             <p:ph idx="1"/>
             <p:extLst>
               <p:ext uri="{D42A27DB-BD31-4B8C-83A1-F6EECF244321}">
-                <p14:modId xmlns:p14="http://schemas.microsoft.com/office/powerpoint/2010/main" val="3375212756"/>
+                <p14:modId xmlns:p14="http://schemas.microsoft.com/office/powerpoint/2010/main" val="76896583"/>
               </p:ext>
             </p:extLst>
           </p:nvPr>
@@ -20688,7 +21124,7 @@
                       </a:pPr>
                       <a:r>
                         <a:rPr lang="en-US" noProof="0" dirty="0"/>
-                        <a:t>Digital pin 28</a:t>
+                        <a:t>Interrupt #0 pin 2</a:t>
                       </a:r>
                     </a:p>
                   </a:txBody>
@@ -23511,11 +23947,7 @@
             </a:br>
             <a:r>
               <a:rPr lang="fr-FR" dirty="0"/>
-              <a:t>Pin #21 = interruption </a:t>
-            </a:r>
-            <a:r>
-              <a:rPr lang="fr-FR"/>
-              <a:t>#2</a:t>
+              <a:t>Pin #21 = interruption #2</a:t>
             </a:r>
           </a:p>
           <a:p>

</xml_diff>

<commit_message>
stoee credentials in EEPROM
</commit_message>
<xml_diff>
--- a/libraries/Diagramm Robot v2.pptx
+++ b/libraries/Diagramm Robot v2.pptx
@@ -267,7 +267,7 @@
           <a:p>
             <a:fld id="{0717AEF8-1597-4679-8926-916E82E12B07}" type="datetimeFigureOut">
               <a:rPr lang="fr-FR" smtClean="0"/>
-              <a:t>23/01/2019</a:t>
+              <a:t>24/01/2019</a:t>
             </a:fld>
             <a:endParaRPr lang="fr-FR"/>
           </a:p>
@@ -465,7 +465,7 @@
           <a:p>
             <a:fld id="{0717AEF8-1597-4679-8926-916E82E12B07}" type="datetimeFigureOut">
               <a:rPr lang="fr-FR" smtClean="0"/>
-              <a:t>23/01/2019</a:t>
+              <a:t>24/01/2019</a:t>
             </a:fld>
             <a:endParaRPr lang="fr-FR"/>
           </a:p>
@@ -673,7 +673,7 @@
           <a:p>
             <a:fld id="{0717AEF8-1597-4679-8926-916E82E12B07}" type="datetimeFigureOut">
               <a:rPr lang="fr-FR" smtClean="0"/>
-              <a:t>23/01/2019</a:t>
+              <a:t>24/01/2019</a:t>
             </a:fld>
             <a:endParaRPr lang="fr-FR"/>
           </a:p>
@@ -871,7 +871,7 @@
           <a:p>
             <a:fld id="{0717AEF8-1597-4679-8926-916E82E12B07}" type="datetimeFigureOut">
               <a:rPr lang="fr-FR" smtClean="0"/>
-              <a:t>23/01/2019</a:t>
+              <a:t>24/01/2019</a:t>
             </a:fld>
             <a:endParaRPr lang="fr-FR"/>
           </a:p>
@@ -1146,7 +1146,7 @@
           <a:p>
             <a:fld id="{0717AEF8-1597-4679-8926-916E82E12B07}" type="datetimeFigureOut">
               <a:rPr lang="fr-FR" smtClean="0"/>
-              <a:t>23/01/2019</a:t>
+              <a:t>24/01/2019</a:t>
             </a:fld>
             <a:endParaRPr lang="fr-FR"/>
           </a:p>
@@ -1411,7 +1411,7 @@
           <a:p>
             <a:fld id="{0717AEF8-1597-4679-8926-916E82E12B07}" type="datetimeFigureOut">
               <a:rPr lang="fr-FR" smtClean="0"/>
-              <a:t>23/01/2019</a:t>
+              <a:t>24/01/2019</a:t>
             </a:fld>
             <a:endParaRPr lang="fr-FR"/>
           </a:p>
@@ -1823,7 +1823,7 @@
           <a:p>
             <a:fld id="{0717AEF8-1597-4679-8926-916E82E12B07}" type="datetimeFigureOut">
               <a:rPr lang="fr-FR" smtClean="0"/>
-              <a:t>23/01/2019</a:t>
+              <a:t>24/01/2019</a:t>
             </a:fld>
             <a:endParaRPr lang="fr-FR"/>
           </a:p>
@@ -1964,7 +1964,7 @@
           <a:p>
             <a:fld id="{0717AEF8-1597-4679-8926-916E82E12B07}" type="datetimeFigureOut">
               <a:rPr lang="fr-FR" smtClean="0"/>
-              <a:t>23/01/2019</a:t>
+              <a:t>24/01/2019</a:t>
             </a:fld>
             <a:endParaRPr lang="fr-FR"/>
           </a:p>
@@ -2077,7 +2077,7 @@
           <a:p>
             <a:fld id="{0717AEF8-1597-4679-8926-916E82E12B07}" type="datetimeFigureOut">
               <a:rPr lang="fr-FR" smtClean="0"/>
-              <a:t>23/01/2019</a:t>
+              <a:t>24/01/2019</a:t>
             </a:fld>
             <a:endParaRPr lang="fr-FR"/>
           </a:p>
@@ -2388,7 +2388,7 @@
           <a:p>
             <a:fld id="{0717AEF8-1597-4679-8926-916E82E12B07}" type="datetimeFigureOut">
               <a:rPr lang="fr-FR" smtClean="0"/>
-              <a:t>23/01/2019</a:t>
+              <a:t>24/01/2019</a:t>
             </a:fld>
             <a:endParaRPr lang="fr-FR"/>
           </a:p>
@@ -2676,7 +2676,7 @@
           <a:p>
             <a:fld id="{0717AEF8-1597-4679-8926-916E82E12B07}" type="datetimeFigureOut">
               <a:rPr lang="fr-FR" smtClean="0"/>
-              <a:t>23/01/2019</a:t>
+              <a:t>24/01/2019</a:t>
             </a:fld>
             <a:endParaRPr lang="fr-FR"/>
           </a:p>
@@ -2917,7 +2917,7 @@
           <a:p>
             <a:fld id="{0717AEF8-1597-4679-8926-916E82E12B07}" type="datetimeFigureOut">
               <a:rPr lang="fr-FR" smtClean="0"/>
-              <a:t>23/01/2019</a:t>
+              <a:t>24/01/2019</a:t>
             </a:fld>
             <a:endParaRPr lang="fr-FR"/>
           </a:p>
@@ -13275,7 +13275,7 @@
         </p:nvSpPr>
         <p:spPr>
           <a:xfrm>
-            <a:off x="10309524" y="3596256"/>
+            <a:off x="10286361" y="3693338"/>
             <a:ext cx="1207065" cy="273425"/>
           </a:xfrm>
           <a:prstGeom prst="rect">
@@ -13323,7 +13323,7 @@
         </p:nvSpPr>
         <p:spPr>
           <a:xfrm>
-            <a:off x="9673176" y="3625073"/>
+            <a:off x="9673803" y="3730704"/>
             <a:ext cx="479833" cy="220039"/>
           </a:xfrm>
           <a:prstGeom prst="ellipse">
@@ -13362,7 +13362,7 @@
                   <a:schemeClr val="tx1"/>
                 </a:solidFill>
               </a:rPr>
-              <a:t>34</a:t>
+              <a:t>38</a:t>
             </a:r>
           </a:p>
         </p:txBody>
@@ -13385,8 +13385,8 @@
         </p:nvCxnSpPr>
         <p:spPr>
           <a:xfrm flipV="1">
-            <a:off x="10153009" y="3732969"/>
-            <a:ext cx="156515" cy="2124"/>
+            <a:off x="10153636" y="3830051"/>
+            <a:ext cx="132725" cy="10673"/>
           </a:xfrm>
           <a:prstGeom prst="bentConnector3">
             <a:avLst>
@@ -13431,7 +13431,7 @@
         </p:nvCxnSpPr>
         <p:spPr>
           <a:xfrm flipV="1">
-            <a:off x="11516589" y="3689098"/>
+            <a:off x="11525257" y="3742400"/>
             <a:ext cx="229670" cy="1"/>
           </a:xfrm>
           <a:prstGeom prst="line">
@@ -13474,7 +13474,7 @@
         </p:nvCxnSpPr>
         <p:spPr>
           <a:xfrm>
-            <a:off x="11516589" y="3786515"/>
+            <a:off x="11517548" y="3856925"/>
             <a:ext cx="478212" cy="3940"/>
           </a:xfrm>
           <a:prstGeom prst="line">
@@ -14696,7 +14696,7 @@
         </p:nvSpPr>
         <p:spPr>
           <a:xfrm>
-            <a:off x="8911591" y="3838289"/>
+            <a:off x="8902646" y="3599542"/>
             <a:ext cx="479833" cy="220039"/>
           </a:xfrm>
           <a:prstGeom prst="ellipse">
@@ -14757,8 +14757,8 @@
         </p:nvCxnSpPr>
         <p:spPr>
           <a:xfrm rot="16200000" flipH="1">
-            <a:off x="6799357" y="1836074"/>
-            <a:ext cx="2872839" cy="1351629"/>
+            <a:off x="6927076" y="1733992"/>
+            <a:ext cx="2589556" cy="1361583"/>
           </a:xfrm>
           <a:prstGeom prst="bentConnector2">
             <a:avLst/>

</xml_diff>

<commit_message>
Improve GO command and tilt pan
</commit_message>
<xml_diff>
--- a/libraries/Diagramm Robot v2.pptx
+++ b/libraries/Diagramm Robot v2.pptx
@@ -12,8 +12,9 @@
     <p:sldId id="262" r:id="rId6"/>
     <p:sldId id="257" r:id="rId7"/>
     <p:sldId id="264" r:id="rId8"/>
-    <p:sldId id="266" r:id="rId9"/>
-    <p:sldId id="260" r:id="rId10"/>
+    <p:sldId id="268" r:id="rId9"/>
+    <p:sldId id="266" r:id="rId10"/>
+    <p:sldId id="260" r:id="rId11"/>
   </p:sldIdLst>
   <p:sldSz cx="12192000" cy="6858000"/>
   <p:notesSz cx="6888163" cy="10020300"/>
@@ -278,7 +279,7 @@
           <a:p>
             <a:fld id="{0717AEF8-1597-4679-8926-916E82E12B07}" type="datetimeFigureOut">
               <a:rPr lang="fr-FR" smtClean="0"/>
-              <a:t>16/02/2019</a:t>
+              <a:t>25/02/2019</a:t>
             </a:fld>
             <a:endParaRPr lang="fr-FR"/>
           </a:p>
@@ -476,7 +477,7 @@
           <a:p>
             <a:fld id="{0717AEF8-1597-4679-8926-916E82E12B07}" type="datetimeFigureOut">
               <a:rPr lang="fr-FR" smtClean="0"/>
-              <a:t>16/02/2019</a:t>
+              <a:t>25/02/2019</a:t>
             </a:fld>
             <a:endParaRPr lang="fr-FR"/>
           </a:p>
@@ -684,7 +685,7 @@
           <a:p>
             <a:fld id="{0717AEF8-1597-4679-8926-916E82E12B07}" type="datetimeFigureOut">
               <a:rPr lang="fr-FR" smtClean="0"/>
-              <a:t>16/02/2019</a:t>
+              <a:t>25/02/2019</a:t>
             </a:fld>
             <a:endParaRPr lang="fr-FR"/>
           </a:p>
@@ -882,7 +883,7 @@
           <a:p>
             <a:fld id="{0717AEF8-1597-4679-8926-916E82E12B07}" type="datetimeFigureOut">
               <a:rPr lang="fr-FR" smtClean="0"/>
-              <a:t>16/02/2019</a:t>
+              <a:t>25/02/2019</a:t>
             </a:fld>
             <a:endParaRPr lang="fr-FR"/>
           </a:p>
@@ -1157,7 +1158,7 @@
           <a:p>
             <a:fld id="{0717AEF8-1597-4679-8926-916E82E12B07}" type="datetimeFigureOut">
               <a:rPr lang="fr-FR" smtClean="0"/>
-              <a:t>16/02/2019</a:t>
+              <a:t>25/02/2019</a:t>
             </a:fld>
             <a:endParaRPr lang="fr-FR"/>
           </a:p>
@@ -1422,7 +1423,7 @@
           <a:p>
             <a:fld id="{0717AEF8-1597-4679-8926-916E82E12B07}" type="datetimeFigureOut">
               <a:rPr lang="fr-FR" smtClean="0"/>
-              <a:t>16/02/2019</a:t>
+              <a:t>25/02/2019</a:t>
             </a:fld>
             <a:endParaRPr lang="fr-FR"/>
           </a:p>
@@ -1834,7 +1835,7 @@
           <a:p>
             <a:fld id="{0717AEF8-1597-4679-8926-916E82E12B07}" type="datetimeFigureOut">
               <a:rPr lang="fr-FR" smtClean="0"/>
-              <a:t>16/02/2019</a:t>
+              <a:t>25/02/2019</a:t>
             </a:fld>
             <a:endParaRPr lang="fr-FR"/>
           </a:p>
@@ -1975,7 +1976,7 @@
           <a:p>
             <a:fld id="{0717AEF8-1597-4679-8926-916E82E12B07}" type="datetimeFigureOut">
               <a:rPr lang="fr-FR" smtClean="0"/>
-              <a:t>16/02/2019</a:t>
+              <a:t>25/02/2019</a:t>
             </a:fld>
             <a:endParaRPr lang="fr-FR"/>
           </a:p>
@@ -2088,7 +2089,7 @@
           <a:p>
             <a:fld id="{0717AEF8-1597-4679-8926-916E82E12B07}" type="datetimeFigureOut">
               <a:rPr lang="fr-FR" smtClean="0"/>
-              <a:t>16/02/2019</a:t>
+              <a:t>25/02/2019</a:t>
             </a:fld>
             <a:endParaRPr lang="fr-FR"/>
           </a:p>
@@ -2399,7 +2400,7 @@
           <a:p>
             <a:fld id="{0717AEF8-1597-4679-8926-916E82E12B07}" type="datetimeFigureOut">
               <a:rPr lang="fr-FR" smtClean="0"/>
-              <a:t>16/02/2019</a:t>
+              <a:t>25/02/2019</a:t>
             </a:fld>
             <a:endParaRPr lang="fr-FR"/>
           </a:p>
@@ -2687,7 +2688,7 @@
           <a:p>
             <a:fld id="{0717AEF8-1597-4679-8926-916E82E12B07}" type="datetimeFigureOut">
               <a:rPr lang="fr-FR" smtClean="0"/>
-              <a:t>16/02/2019</a:t>
+              <a:t>25/02/2019</a:t>
             </a:fld>
             <a:endParaRPr lang="fr-FR"/>
           </a:p>
@@ -2928,7 +2929,7 @@
           <a:p>
             <a:fld id="{0717AEF8-1597-4679-8926-916E82E12B07}" type="datetimeFigureOut">
               <a:rPr lang="fr-FR" smtClean="0"/>
-              <a:t>16/02/2019</a:t>
+              <a:t>25/02/2019</a:t>
             </a:fld>
             <a:endParaRPr lang="fr-FR"/>
           </a:p>
@@ -7349,6 +7350,254 @@
 </p:sld>
 </file>
 
+<file path=ppt/slides/slide10.xml><?xml version="1.0" encoding="utf-8"?>
+<p:sld xmlns:a="http://schemas.openxmlformats.org/drawingml/2006/main" xmlns:r="http://schemas.openxmlformats.org/officeDocument/2006/relationships" xmlns:p="http://schemas.openxmlformats.org/presentationml/2006/main">
+  <p:cSld>
+    <p:spTree>
+      <p:nvGrpSpPr>
+        <p:cNvPr id="1" name=""/>
+        <p:cNvGrpSpPr/>
+        <p:nvPr/>
+      </p:nvGrpSpPr>
+      <p:grpSpPr>
+        <a:xfrm>
+          <a:off x="0" y="0"/>
+          <a:ext cx="0" cy="0"/>
+          <a:chOff x="0" y="0"/>
+          <a:chExt cx="0" cy="0"/>
+        </a:xfrm>
+      </p:grpSpPr>
+      <p:sp>
+        <p:nvSpPr>
+          <p:cNvPr id="2" name="Titre 1">
+            <a:extLst>
+              <a:ext uri="{FF2B5EF4-FFF2-40B4-BE49-F238E27FC236}">
+                <a16:creationId xmlns:a16="http://schemas.microsoft.com/office/drawing/2014/main" id="{7D7887D6-7566-47C9-A25C-3F4F54D9EBDC}"/>
+              </a:ext>
+            </a:extLst>
+          </p:cNvPr>
+          <p:cNvSpPr>
+            <a:spLocks noGrp="1"/>
+          </p:cNvSpPr>
+          <p:nvPr>
+            <p:ph type="title"/>
+          </p:nvPr>
+        </p:nvSpPr>
+        <p:spPr/>
+        <p:txBody>
+          <a:bodyPr/>
+          <a:lstStyle/>
+          <a:p>
+            <a:r>
+              <a:rPr lang="fr-FR" dirty="0" err="1"/>
+              <a:t>Special</a:t>
+            </a:r>
+            <a:r>
+              <a:rPr lang="fr-FR" dirty="0"/>
+              <a:t> pins Arduino MEGA2560</a:t>
+            </a:r>
+          </a:p>
+        </p:txBody>
+      </p:sp>
+      <p:sp>
+        <p:nvSpPr>
+          <p:cNvPr id="3" name="Espace réservé du contenu 2">
+            <a:extLst>
+              <a:ext uri="{FF2B5EF4-FFF2-40B4-BE49-F238E27FC236}">
+                <a16:creationId xmlns:a16="http://schemas.microsoft.com/office/drawing/2014/main" id="{570C9186-32F7-45DB-A01D-E527B032981A}"/>
+              </a:ext>
+            </a:extLst>
+          </p:cNvPr>
+          <p:cNvSpPr>
+            <a:spLocks noGrp="1"/>
+          </p:cNvSpPr>
+          <p:nvPr>
+            <p:ph idx="1"/>
+          </p:nvPr>
+        </p:nvSpPr>
+        <p:spPr/>
+        <p:txBody>
+          <a:bodyPr>
+            <a:normAutofit fontScale="77500" lnSpcReduction="20000"/>
+          </a:bodyPr>
+          <a:lstStyle/>
+          <a:p>
+            <a:pPr marL="0" indent="0">
+              <a:buNone/>
+            </a:pPr>
+            <a:r>
+              <a:rPr lang="fr-FR" sz="3500" u="sng" dirty="0"/>
+              <a:t>Interruptions</a:t>
+            </a:r>
+          </a:p>
+          <a:p>
+            <a:pPr marL="0" indent="0">
+              <a:buNone/>
+            </a:pPr>
+            <a:r>
+              <a:rPr lang="fr-FR" dirty="0"/>
+              <a:t>Pin #2 = interruption #0</a:t>
+            </a:r>
+            <a:br>
+              <a:rPr lang="fr-FR" dirty="0"/>
+            </a:br>
+            <a:r>
+              <a:rPr lang="fr-FR" dirty="0"/>
+              <a:t>Pin #3 = interruption #1</a:t>
+            </a:r>
+            <a:br>
+              <a:rPr lang="fr-FR" dirty="0"/>
+            </a:br>
+            <a:r>
+              <a:rPr lang="fr-FR" dirty="0"/>
+              <a:t>Pin #18 = interruption #5</a:t>
+            </a:r>
+            <a:br>
+              <a:rPr lang="fr-FR" dirty="0"/>
+            </a:br>
+            <a:r>
+              <a:rPr lang="fr-FR" dirty="0"/>
+              <a:t>Pin #19 = interruption #4</a:t>
+            </a:r>
+            <a:br>
+              <a:rPr lang="fr-FR" dirty="0"/>
+            </a:br>
+            <a:r>
+              <a:rPr lang="fr-FR" dirty="0"/>
+              <a:t>Pin #20 = interruption #3</a:t>
+            </a:r>
+            <a:br>
+              <a:rPr lang="fr-FR" dirty="0"/>
+            </a:br>
+            <a:r>
+              <a:rPr lang="fr-FR" dirty="0"/>
+              <a:t>Pin #21 = interruption #2</a:t>
+            </a:r>
+          </a:p>
+          <a:p>
+            <a:pPr marL="0" indent="0">
+              <a:buNone/>
+            </a:pPr>
+            <a:endParaRPr lang="fr-FR" dirty="0"/>
+          </a:p>
+          <a:p>
+            <a:pPr marL="0" indent="0">
+              <a:buNone/>
+            </a:pPr>
+            <a:r>
+              <a:rPr lang="fr-FR" sz="3500" u="sng" dirty="0"/>
+              <a:t>SPI</a:t>
+            </a:r>
+          </a:p>
+          <a:p>
+            <a:pPr marL="0" indent="0">
+              <a:buNone/>
+            </a:pPr>
+            <a:r>
+              <a:rPr lang="fi-FI" dirty="0"/>
+              <a:t>Pin</a:t>
+            </a:r>
+            <a:r>
+              <a:rPr lang="fr-FR" dirty="0"/>
+              <a:t> #</a:t>
+            </a:r>
+            <a:r>
+              <a:rPr lang="fi-FI" dirty="0"/>
+              <a:t>10: CS</a:t>
+            </a:r>
+            <a:endParaRPr lang="fr-FR" dirty="0"/>
+          </a:p>
+          <a:p>
+            <a:pPr marL="0" indent="0">
+              <a:buNone/>
+            </a:pPr>
+            <a:r>
+              <a:rPr lang="fi-FI" dirty="0"/>
+              <a:t>pin</a:t>
+            </a:r>
+            <a:r>
+              <a:rPr lang="fr-FR" dirty="0"/>
+              <a:t> #</a:t>
+            </a:r>
+            <a:r>
+              <a:rPr lang="fi-FI" dirty="0"/>
+              <a:t>11-&gt;pin</a:t>
+            </a:r>
+            <a:r>
+              <a:rPr lang="fr-FR" dirty="0"/>
+              <a:t> #</a:t>
+            </a:r>
+            <a:r>
+              <a:rPr lang="fi-FI" dirty="0"/>
+              <a:t>51</a:t>
+            </a:r>
+          </a:p>
+          <a:p>
+            <a:pPr marL="0" indent="0">
+              <a:buNone/>
+            </a:pPr>
+            <a:r>
+              <a:rPr lang="fi-FI" dirty="0"/>
+              <a:t>pin</a:t>
+            </a:r>
+            <a:r>
+              <a:rPr lang="fr-FR" dirty="0"/>
+              <a:t> #</a:t>
+            </a:r>
+            <a:r>
+              <a:rPr lang="fi-FI" dirty="0"/>
+              <a:t>12-&gt;pin</a:t>
+            </a:r>
+            <a:r>
+              <a:rPr lang="fr-FR" dirty="0"/>
+              <a:t> #</a:t>
+            </a:r>
+            <a:r>
+              <a:rPr lang="fi-FI" dirty="0"/>
+              <a:t>50</a:t>
+            </a:r>
+          </a:p>
+          <a:p>
+            <a:pPr marL="0" indent="0">
+              <a:buNone/>
+            </a:pPr>
+            <a:r>
+              <a:rPr lang="fi-FI" dirty="0"/>
+              <a:t>pin</a:t>
+            </a:r>
+            <a:r>
+              <a:rPr lang="fr-FR" dirty="0"/>
+              <a:t> #</a:t>
+            </a:r>
+            <a:r>
+              <a:rPr lang="fi-FI" dirty="0"/>
+              <a:t>13-&gt;pin</a:t>
+            </a:r>
+            <a:r>
+              <a:rPr lang="fr-FR" dirty="0"/>
+              <a:t> #</a:t>
+            </a:r>
+            <a:r>
+              <a:rPr lang="fi-FI" dirty="0"/>
+              <a:t>52</a:t>
+            </a:r>
+            <a:endParaRPr lang="fr-FR" dirty="0"/>
+          </a:p>
+        </p:txBody>
+      </p:sp>
+    </p:spTree>
+    <p:extLst>
+      <p:ext uri="{BB962C8B-B14F-4D97-AF65-F5344CB8AC3E}">
+        <p14:creationId xmlns:p14="http://schemas.microsoft.com/office/powerpoint/2010/main" val="3722056244"/>
+      </p:ext>
+    </p:extLst>
+  </p:cSld>
+  <p:clrMapOvr>
+    <a:masterClrMapping/>
+  </p:clrMapOvr>
+</p:sld>
+</file>
+
 <file path=ppt/slides/slide2.xml><?xml version="1.0" encoding="utf-8"?>
 <p:sld xmlns:a="http://schemas.openxmlformats.org/drawingml/2006/main" xmlns:r="http://schemas.openxmlformats.org/officeDocument/2006/relationships" xmlns:p="http://schemas.openxmlformats.org/presentationml/2006/main">
   <p:cSld>
@@ -22776,14 +23025,14 @@
           <p:nvPr>
             <p:extLst>
               <p:ext uri="{D42A27DB-BD31-4B8C-83A1-F6EECF244321}">
-                <p14:modId xmlns:p14="http://schemas.microsoft.com/office/powerpoint/2010/main" val="2137859877"/>
+                <p14:modId xmlns:p14="http://schemas.microsoft.com/office/powerpoint/2010/main" val="2054398887"/>
               </p:ext>
             </p:extLst>
           </p:nvPr>
         </p:nvGraphicFramePr>
         <p:xfrm>
           <a:off x="673075" y="2614630"/>
-          <a:ext cx="9211154" cy="2651760"/>
+          <a:ext cx="9211154" cy="2804160"/>
         </p:xfrm>
         <a:graphic>
           <a:graphicData uri="http://schemas.openxmlformats.org/drawingml/2006/table">
@@ -23245,6 +23494,14 @@
                         <a:t>CMD_TEST                            0x0C</a:t>
                       </a:r>
                     </a:p>
+                    <a:p>
+                      <a:r>
+                        <a:rPr lang="fr-FR" sz="1000" dirty="0">
+                          <a:latin typeface="+mn-lt"/>
+                        </a:rPr>
+                        <a:t>CMD_RUN                             0x0D</a:t>
+                      </a:r>
+                    </a:p>
                   </a:txBody>
                   <a:tcPr/>
                 </a:tc>
@@ -23819,9 +24076,12 @@
           <a:p>
             <a:r>
               <a:rPr lang="en-US" dirty="0" err="1"/>
-              <a:t>Commandes</a:t>
-            </a:r>
-            <a:endParaRPr lang="en-US" dirty="0"/>
+              <a:t>Bluetooh</a:t>
+            </a:r>
+            <a:r>
+              <a:rPr lang="en-US" dirty="0"/>
+              <a:t> Commands </a:t>
+            </a:r>
           </a:p>
         </p:txBody>
       </p:sp>
@@ -23841,7 +24101,1100 @@
             <p:ph idx="1"/>
             <p:extLst>
               <p:ext uri="{D42A27DB-BD31-4B8C-83A1-F6EECF244321}">
-                <p14:modId xmlns:p14="http://schemas.microsoft.com/office/powerpoint/2010/main" val="3175664207"/>
+                <p14:modId xmlns:p14="http://schemas.microsoft.com/office/powerpoint/2010/main" val="2328218016"/>
+              </p:ext>
+            </p:extLst>
+          </p:nvPr>
+        </p:nvGraphicFramePr>
+        <p:xfrm>
+          <a:off x="723901" y="829734"/>
+          <a:ext cx="10132364" cy="5289412"/>
+        </p:xfrm>
+        <a:graphic>
+          <a:graphicData uri="http://schemas.openxmlformats.org/drawingml/2006/table">
+            <a:tbl>
+              <a:tblPr firstRow="1" bandRow="1">
+                <a:tableStyleId>{5C22544A-7EE6-4342-B048-85BDC9FD1C3A}</a:tableStyleId>
+              </a:tblPr>
+              <a:tblGrid>
+                <a:gridCol w="1727637">
+                  <a:extLst>
+                    <a:ext uri="{9D8B030D-6E8A-4147-A177-3AD203B41FA5}">
+                      <a16:colId xmlns:a16="http://schemas.microsoft.com/office/drawing/2014/main" val="141237979"/>
+                    </a:ext>
+                  </a:extLst>
+                </a:gridCol>
+                <a:gridCol w="5320862">
+                  <a:extLst>
+                    <a:ext uri="{9D8B030D-6E8A-4147-A177-3AD203B41FA5}">
+                      <a16:colId xmlns:a16="http://schemas.microsoft.com/office/drawing/2014/main" val="2232030455"/>
+                    </a:ext>
+                  </a:extLst>
+                </a:gridCol>
+                <a:gridCol w="3083865">
+                  <a:extLst>
+                    <a:ext uri="{9D8B030D-6E8A-4147-A177-3AD203B41FA5}">
+                      <a16:colId xmlns:a16="http://schemas.microsoft.com/office/drawing/2014/main" val="20002"/>
+                    </a:ext>
+                  </a:extLst>
+                </a:gridCol>
+              </a:tblGrid>
+              <a:tr h="389475">
+                <a:tc>
+                  <a:txBody>
+                    <a:bodyPr/>
+                    <a:lstStyle/>
+                    <a:p>
+                      <a:r>
+                        <a:rPr lang="fr-FR" dirty="0"/>
+                        <a:t>Commande</a:t>
+                      </a:r>
+                    </a:p>
+                  </a:txBody>
+                  <a:tcPr/>
+                </a:tc>
+                <a:tc>
+                  <a:txBody>
+                    <a:bodyPr/>
+                    <a:lstStyle/>
+                    <a:p>
+                      <a:r>
+                        <a:rPr lang="fr-FR" dirty="0" err="1"/>
+                        <a:t>Purpose</a:t>
+                      </a:r>
+                      <a:endParaRPr lang="fr-FR" dirty="0"/>
+                    </a:p>
+                  </a:txBody>
+                  <a:tcPr/>
+                </a:tc>
+                <a:tc>
+                  <a:txBody>
+                    <a:bodyPr/>
+                    <a:lstStyle/>
+                    <a:p>
+                      <a:r>
+                        <a:rPr lang="fr-FR" dirty="0"/>
+                        <a:t>BLE message</a:t>
+                      </a:r>
+                    </a:p>
+                  </a:txBody>
+                  <a:tcPr/>
+                </a:tc>
+                <a:extLst>
+                  <a:ext uri="{0D108BD9-81ED-4DB2-BD59-A6C34878D82A}">
+                    <a16:rowId xmlns:a16="http://schemas.microsoft.com/office/drawing/2014/main" val="3930063906"/>
+                  </a:ext>
+                </a:extLst>
+              </a:tr>
+              <a:tr h="388874">
+                <a:tc>
+                  <a:txBody>
+                    <a:bodyPr/>
+                    <a:lstStyle/>
+                    <a:p>
+                      <a:r>
+                        <a:rPr lang="fr-FR" dirty="0" err="1"/>
+                        <a:t>Forward</a:t>
+                      </a:r>
+                      <a:endParaRPr lang="fr-FR" dirty="0"/>
+                    </a:p>
+                  </a:txBody>
+                  <a:tcPr/>
+                </a:tc>
+                <a:tc>
+                  <a:txBody>
+                    <a:bodyPr/>
+                    <a:lstStyle/>
+                    <a:p>
+                      <a:pPr marL="0" marR="0" lvl="0" indent="0" algn="l" defTabSz="914400" rtl="0" eaLnBrk="1" fontAlgn="auto" latinLnBrk="0" hangingPunct="1">
+                        <a:lnSpc>
+                          <a:spcPct val="100000"/>
+                        </a:lnSpc>
+                        <a:spcBef>
+                          <a:spcPts val="0"/>
+                        </a:spcBef>
+                        <a:spcAft>
+                          <a:spcPts val="0"/>
+                        </a:spcAft>
+                        <a:buClrTx/>
+                        <a:buSzTx/>
+                        <a:buFontTx/>
+                        <a:buNone/>
+                        <a:tabLst/>
+                        <a:defRPr/>
+                      </a:pPr>
+                      <a:r>
+                        <a:rPr lang="fr-FR" dirty="0" err="1"/>
+                        <a:t>Run</a:t>
+                      </a:r>
+                      <a:r>
+                        <a:rPr lang="fr-FR" dirty="0"/>
+                        <a:t> </a:t>
+                      </a:r>
+                      <a:r>
+                        <a:rPr lang="fr-FR" dirty="0" err="1"/>
+                        <a:t>forward</a:t>
+                      </a:r>
+                      <a:endParaRPr lang="fr-FR" dirty="0"/>
+                    </a:p>
+                  </a:txBody>
+                  <a:tcPr/>
+                </a:tc>
+                <a:tc>
+                  <a:txBody>
+                    <a:bodyPr/>
+                    <a:lstStyle/>
+                    <a:p>
+                      <a:pPr marL="0" marR="0" lvl="0" indent="0" algn="l" defTabSz="914400" rtl="0" eaLnBrk="1" fontAlgn="auto" latinLnBrk="0" hangingPunct="1">
+                        <a:lnSpc>
+                          <a:spcPct val="100000"/>
+                        </a:lnSpc>
+                        <a:spcBef>
+                          <a:spcPts val="0"/>
+                        </a:spcBef>
+                        <a:spcAft>
+                          <a:spcPts val="0"/>
+                        </a:spcAft>
+                        <a:buClrTx/>
+                        <a:buSzTx/>
+                        <a:buFontTx/>
+                        <a:buNone/>
+                        <a:tabLst/>
+                        <a:defRPr/>
+                      </a:pPr>
+                      <a:r>
+                        <a:rPr lang="fr-FR" dirty="0"/>
+                        <a:t>CMD=START|&gt;</a:t>
+                      </a:r>
+                    </a:p>
+                  </a:txBody>
+                  <a:tcPr/>
+                </a:tc>
+                <a:extLst>
+                  <a:ext uri="{0D108BD9-81ED-4DB2-BD59-A6C34878D82A}">
+                    <a16:rowId xmlns:a16="http://schemas.microsoft.com/office/drawing/2014/main" val="3459295351"/>
+                  </a:ext>
+                </a:extLst>
+              </a:tr>
+              <a:tr h="410312">
+                <a:tc>
+                  <a:txBody>
+                    <a:bodyPr/>
+                    <a:lstStyle/>
+                    <a:p>
+                      <a:r>
+                        <a:rPr lang="fr-FR" dirty="0" err="1"/>
+                        <a:t>Left</a:t>
+                      </a:r>
+                      <a:endParaRPr lang="fr-FR" dirty="0"/>
+                    </a:p>
+                  </a:txBody>
+                  <a:tcPr/>
+                </a:tc>
+                <a:tc>
+                  <a:txBody>
+                    <a:bodyPr/>
+                    <a:lstStyle/>
+                    <a:p>
+                      <a:pPr marL="0" marR="0" lvl="0" indent="0" algn="l" defTabSz="914400" rtl="0" eaLnBrk="1" fontAlgn="auto" latinLnBrk="0" hangingPunct="1">
+                        <a:lnSpc>
+                          <a:spcPct val="100000"/>
+                        </a:lnSpc>
+                        <a:spcBef>
+                          <a:spcPts val="0"/>
+                        </a:spcBef>
+                        <a:spcAft>
+                          <a:spcPts val="0"/>
+                        </a:spcAft>
+                        <a:buClrTx/>
+                        <a:buSzTx/>
+                        <a:buFontTx/>
+                        <a:buNone/>
+                        <a:tabLst/>
+                        <a:defRPr/>
+                      </a:pPr>
+                      <a:r>
+                        <a:rPr lang="fr-FR" dirty="0" err="1"/>
+                        <a:t>Turn</a:t>
+                      </a:r>
+                      <a:r>
+                        <a:rPr lang="fr-FR" dirty="0"/>
+                        <a:t> </a:t>
+                      </a:r>
+                      <a:r>
+                        <a:rPr lang="fr-FR" dirty="0" err="1"/>
+                        <a:t>left</a:t>
+                      </a:r>
+                      <a:r>
+                        <a:rPr lang="fr-FR" dirty="0"/>
+                        <a:t> 45°</a:t>
+                      </a:r>
+                    </a:p>
+                  </a:txBody>
+                  <a:tcPr/>
+                </a:tc>
+                <a:tc>
+                  <a:txBody>
+                    <a:bodyPr/>
+                    <a:lstStyle/>
+                    <a:p>
+                      <a:pPr marL="0" marR="0" lvl="0" indent="0" algn="l" defTabSz="914400" rtl="0" eaLnBrk="1" fontAlgn="auto" latinLnBrk="0" hangingPunct="1">
+                        <a:lnSpc>
+                          <a:spcPct val="100000"/>
+                        </a:lnSpc>
+                        <a:spcBef>
+                          <a:spcPts val="0"/>
+                        </a:spcBef>
+                        <a:spcAft>
+                          <a:spcPts val="0"/>
+                        </a:spcAft>
+                        <a:buClrTx/>
+                        <a:buSzTx/>
+                        <a:buFontTx/>
+                        <a:buNone/>
+                        <a:tabLst/>
+                        <a:defRPr/>
+                      </a:pPr>
+                      <a:r>
+                        <a:rPr lang="fr-FR" dirty="0"/>
+                        <a:t>CMD=TURN|P=-45|&gt;</a:t>
+                      </a:r>
+                    </a:p>
+                  </a:txBody>
+                  <a:tcPr/>
+                </a:tc>
+                <a:extLst>
+                  <a:ext uri="{0D108BD9-81ED-4DB2-BD59-A6C34878D82A}">
+                    <a16:rowId xmlns:a16="http://schemas.microsoft.com/office/drawing/2014/main" val="11531206"/>
+                  </a:ext>
+                </a:extLst>
+              </a:tr>
+              <a:tr h="415984">
+                <a:tc>
+                  <a:txBody>
+                    <a:bodyPr/>
+                    <a:lstStyle/>
+                    <a:p>
+                      <a:r>
+                        <a:rPr lang="fr-FR" dirty="0"/>
+                        <a:t>Right</a:t>
+                      </a:r>
+                    </a:p>
+                  </a:txBody>
+                  <a:tcPr/>
+                </a:tc>
+                <a:tc>
+                  <a:txBody>
+                    <a:bodyPr/>
+                    <a:lstStyle/>
+                    <a:p>
+                      <a:pPr marL="0" marR="0" lvl="0" indent="0" algn="l" defTabSz="914400" rtl="0" eaLnBrk="1" fontAlgn="auto" latinLnBrk="0" hangingPunct="1">
+                        <a:lnSpc>
+                          <a:spcPct val="100000"/>
+                        </a:lnSpc>
+                        <a:spcBef>
+                          <a:spcPts val="0"/>
+                        </a:spcBef>
+                        <a:spcAft>
+                          <a:spcPts val="0"/>
+                        </a:spcAft>
+                        <a:buClrTx/>
+                        <a:buSzTx/>
+                        <a:buFontTx/>
+                        <a:buNone/>
+                        <a:tabLst/>
+                        <a:defRPr/>
+                      </a:pPr>
+                      <a:r>
+                        <a:rPr lang="fr-FR" dirty="0" err="1"/>
+                        <a:t>Turn</a:t>
+                      </a:r>
+                      <a:r>
+                        <a:rPr lang="fr-FR" dirty="0"/>
+                        <a:t> right 45°</a:t>
+                      </a:r>
+                    </a:p>
+                  </a:txBody>
+                  <a:tcPr/>
+                </a:tc>
+                <a:tc>
+                  <a:txBody>
+                    <a:bodyPr/>
+                    <a:lstStyle/>
+                    <a:p>
+                      <a:pPr marL="0" marR="0" lvl="0" indent="0" algn="l" defTabSz="914400" rtl="0" eaLnBrk="1" fontAlgn="auto" latinLnBrk="0" hangingPunct="1">
+                        <a:lnSpc>
+                          <a:spcPct val="100000"/>
+                        </a:lnSpc>
+                        <a:spcBef>
+                          <a:spcPts val="0"/>
+                        </a:spcBef>
+                        <a:spcAft>
+                          <a:spcPts val="0"/>
+                        </a:spcAft>
+                        <a:buClrTx/>
+                        <a:buSzTx/>
+                        <a:buFontTx/>
+                        <a:buNone/>
+                        <a:tabLst/>
+                        <a:defRPr/>
+                      </a:pPr>
+                      <a:r>
+                        <a:rPr lang="fr-FR" dirty="0"/>
+                        <a:t>CMD=TURN|P=45|&gt;</a:t>
+                      </a:r>
+                    </a:p>
+                  </a:txBody>
+                  <a:tcPr/>
+                </a:tc>
+                <a:extLst>
+                  <a:ext uri="{0D108BD9-81ED-4DB2-BD59-A6C34878D82A}">
+                    <a16:rowId xmlns:a16="http://schemas.microsoft.com/office/drawing/2014/main" val="10003"/>
+                  </a:ext>
+                </a:extLst>
+              </a:tr>
+              <a:tr h="382242">
+                <a:tc>
+                  <a:txBody>
+                    <a:bodyPr/>
+                    <a:lstStyle/>
+                    <a:p>
+                      <a:r>
+                        <a:rPr lang="fr-FR" dirty="0"/>
+                        <a:t>Stop</a:t>
+                      </a:r>
+                    </a:p>
+                  </a:txBody>
+                  <a:tcPr/>
+                </a:tc>
+                <a:tc>
+                  <a:txBody>
+                    <a:bodyPr/>
+                    <a:lstStyle/>
+                    <a:p>
+                      <a:pPr marL="0" marR="0" lvl="0" indent="0" algn="l" defTabSz="914400" rtl="0" eaLnBrk="1" fontAlgn="auto" latinLnBrk="0" hangingPunct="1">
+                        <a:lnSpc>
+                          <a:spcPct val="100000"/>
+                        </a:lnSpc>
+                        <a:spcBef>
+                          <a:spcPts val="0"/>
+                        </a:spcBef>
+                        <a:spcAft>
+                          <a:spcPts val="0"/>
+                        </a:spcAft>
+                        <a:buClrTx/>
+                        <a:buSzTx/>
+                        <a:buFontTx/>
+                        <a:buNone/>
+                        <a:tabLst/>
+                        <a:defRPr/>
+                      </a:pPr>
+                      <a:r>
+                        <a:rPr lang="fr-FR" dirty="0"/>
+                        <a:t>Stop</a:t>
+                      </a:r>
+                    </a:p>
+                  </a:txBody>
+                  <a:tcPr/>
+                </a:tc>
+                <a:tc>
+                  <a:txBody>
+                    <a:bodyPr/>
+                    <a:lstStyle/>
+                    <a:p>
+                      <a:pPr marL="0" marR="0" lvl="0" indent="0" algn="l" defTabSz="914400" rtl="0" eaLnBrk="1" fontAlgn="auto" latinLnBrk="0" hangingPunct="1">
+                        <a:lnSpc>
+                          <a:spcPct val="100000"/>
+                        </a:lnSpc>
+                        <a:spcBef>
+                          <a:spcPts val="0"/>
+                        </a:spcBef>
+                        <a:spcAft>
+                          <a:spcPts val="0"/>
+                        </a:spcAft>
+                        <a:buClrTx/>
+                        <a:buSzTx/>
+                        <a:buFontTx/>
+                        <a:buNone/>
+                        <a:tabLst/>
+                        <a:defRPr/>
+                      </a:pPr>
+                      <a:r>
+                        <a:rPr lang="fr-FR" dirty="0"/>
+                        <a:t>CMD=STOP|&gt;</a:t>
+                      </a:r>
+                    </a:p>
+                  </a:txBody>
+                  <a:tcPr/>
+                </a:tc>
+                <a:extLst>
+                  <a:ext uri="{0D108BD9-81ED-4DB2-BD59-A6C34878D82A}">
+                    <a16:rowId xmlns:a16="http://schemas.microsoft.com/office/drawing/2014/main" val="1140387248"/>
+                  </a:ext>
+                </a:extLst>
+              </a:tr>
+              <a:tr h="472966">
+                <a:tc>
+                  <a:txBody>
+                    <a:bodyPr/>
+                    <a:lstStyle/>
+                    <a:p>
+                      <a:r>
+                        <a:rPr lang="fr-FR" dirty="0"/>
+                        <a:t>Go</a:t>
+                      </a:r>
+                    </a:p>
+                  </a:txBody>
+                  <a:tcPr/>
+                </a:tc>
+                <a:tc>
+                  <a:txBody>
+                    <a:bodyPr/>
+                    <a:lstStyle/>
+                    <a:p>
+                      <a:pPr marL="0" marR="0" lvl="0" indent="0" algn="l" defTabSz="914400" rtl="0" eaLnBrk="1" fontAlgn="auto" latinLnBrk="0" hangingPunct="1">
+                        <a:lnSpc>
+                          <a:spcPct val="100000"/>
+                        </a:lnSpc>
+                        <a:spcBef>
+                          <a:spcPts val="0"/>
+                        </a:spcBef>
+                        <a:spcAft>
+                          <a:spcPts val="0"/>
+                        </a:spcAft>
+                        <a:buClrTx/>
+                        <a:buSzTx/>
+                        <a:buFontTx/>
+                        <a:buNone/>
+                        <a:tabLst/>
+                        <a:defRPr/>
+                      </a:pPr>
+                      <a:r>
+                        <a:rPr lang="fr-FR" dirty="0"/>
+                        <a:t>Go in </a:t>
+                      </a:r>
+                      <a:r>
+                        <a:rPr lang="fr-FR" dirty="0" err="1"/>
+                        <a:t>autonomous</a:t>
+                      </a:r>
+                      <a:r>
+                        <a:rPr lang="fr-FR" dirty="0"/>
+                        <a:t> mode, timeout</a:t>
+                      </a:r>
+                      <a:r>
+                        <a:rPr lang="fr-FR" baseline="0" dirty="0"/>
+                        <a:t> 20 seconds</a:t>
+                      </a:r>
+                      <a:endParaRPr lang="fr-FR" dirty="0"/>
+                    </a:p>
+                  </a:txBody>
+                  <a:tcPr/>
+                </a:tc>
+                <a:tc>
+                  <a:txBody>
+                    <a:bodyPr/>
+                    <a:lstStyle/>
+                    <a:p>
+                      <a:pPr marL="0" marR="0" lvl="0" indent="0" algn="l" defTabSz="914400" rtl="0" eaLnBrk="1" fontAlgn="auto" latinLnBrk="0" hangingPunct="1">
+                        <a:lnSpc>
+                          <a:spcPct val="100000"/>
+                        </a:lnSpc>
+                        <a:spcBef>
+                          <a:spcPts val="0"/>
+                        </a:spcBef>
+                        <a:spcAft>
+                          <a:spcPts val="0"/>
+                        </a:spcAft>
+                        <a:buClrTx/>
+                        <a:buSzTx/>
+                        <a:buFontTx/>
+                        <a:buNone/>
+                        <a:tabLst/>
+                        <a:defRPr/>
+                      </a:pPr>
+                      <a:r>
+                        <a:rPr lang="fr-FR" dirty="0"/>
+                        <a:t>CMD=GO|P=20|&gt;</a:t>
+                      </a:r>
+                    </a:p>
+                  </a:txBody>
+                  <a:tcPr/>
+                </a:tc>
+                <a:extLst>
+                  <a:ext uri="{0D108BD9-81ED-4DB2-BD59-A6C34878D82A}">
+                    <a16:rowId xmlns:a16="http://schemas.microsoft.com/office/drawing/2014/main" val="10005"/>
+                  </a:ext>
+                </a:extLst>
+              </a:tr>
+              <a:tr h="472414">
+                <a:tc>
+                  <a:txBody>
+                    <a:bodyPr/>
+                    <a:lstStyle/>
+                    <a:p>
+                      <a:r>
+                        <a:rPr lang="fr-FR" dirty="0"/>
+                        <a:t>Picture</a:t>
+                      </a:r>
+                    </a:p>
+                  </a:txBody>
+                  <a:tcPr/>
+                </a:tc>
+                <a:tc>
+                  <a:txBody>
+                    <a:bodyPr/>
+                    <a:lstStyle/>
+                    <a:p>
+                      <a:pPr marL="0" marR="0" lvl="0" indent="0" algn="l" defTabSz="914400" rtl="0" eaLnBrk="1" fontAlgn="auto" latinLnBrk="0" hangingPunct="1">
+                        <a:lnSpc>
+                          <a:spcPct val="100000"/>
+                        </a:lnSpc>
+                        <a:spcBef>
+                          <a:spcPts val="0"/>
+                        </a:spcBef>
+                        <a:spcAft>
+                          <a:spcPts val="0"/>
+                        </a:spcAft>
+                        <a:buClrTx/>
+                        <a:buSzTx/>
+                        <a:buFontTx/>
+                        <a:buNone/>
+                        <a:tabLst/>
+                        <a:defRPr/>
+                      </a:pPr>
+                      <a:r>
+                        <a:rPr lang="fr-FR" dirty="0" err="1"/>
+                        <a:t>Make</a:t>
+                      </a:r>
+                      <a:r>
+                        <a:rPr lang="fr-FR" dirty="0"/>
+                        <a:t> </a:t>
+                      </a:r>
+                      <a:r>
+                        <a:rPr lang="fr-FR" dirty="0" err="1"/>
+                        <a:t>picture</a:t>
+                      </a:r>
+                      <a:endParaRPr lang="fr-FR" dirty="0"/>
+                    </a:p>
+                  </a:txBody>
+                  <a:tcPr/>
+                </a:tc>
+                <a:tc>
+                  <a:txBody>
+                    <a:bodyPr/>
+                    <a:lstStyle/>
+                    <a:p>
+                      <a:pPr marL="0" marR="0" lvl="0" indent="0" algn="l" defTabSz="914400" rtl="0" eaLnBrk="1" fontAlgn="auto" latinLnBrk="0" hangingPunct="1">
+                        <a:lnSpc>
+                          <a:spcPct val="100000"/>
+                        </a:lnSpc>
+                        <a:spcBef>
+                          <a:spcPts val="0"/>
+                        </a:spcBef>
+                        <a:spcAft>
+                          <a:spcPts val="0"/>
+                        </a:spcAft>
+                        <a:buClrTx/>
+                        <a:buSzTx/>
+                        <a:buFontTx/>
+                        <a:buNone/>
+                        <a:tabLst/>
+                        <a:defRPr/>
+                      </a:pPr>
+                      <a:r>
+                        <a:rPr lang="fr-FR" dirty="0"/>
+                        <a:t>CMD=PICTURE|&gt;</a:t>
+                      </a:r>
+                    </a:p>
+                  </a:txBody>
+                  <a:tcPr/>
+                </a:tc>
+                <a:extLst>
+                  <a:ext uri="{0D108BD9-81ED-4DB2-BD59-A6C34878D82A}">
+                    <a16:rowId xmlns:a16="http://schemas.microsoft.com/office/drawing/2014/main" val="4031062607"/>
+                  </a:ext>
+                </a:extLst>
+              </a:tr>
+              <a:tr h="389475">
+                <a:tc>
+                  <a:txBody>
+                    <a:bodyPr/>
+                    <a:lstStyle/>
+                    <a:p>
+                      <a:r>
+                        <a:rPr lang="fr-FR" dirty="0" err="1"/>
+                        <a:t>Get</a:t>
+                      </a:r>
+                      <a:r>
+                        <a:rPr lang="fr-FR" dirty="0"/>
+                        <a:t> infos</a:t>
+                      </a:r>
+                    </a:p>
+                  </a:txBody>
+                  <a:tcPr/>
+                </a:tc>
+                <a:tc>
+                  <a:txBody>
+                    <a:bodyPr/>
+                    <a:lstStyle/>
+                    <a:p>
+                      <a:pPr marL="0" marR="0" lvl="0" indent="0" algn="l" defTabSz="914400" rtl="0" eaLnBrk="1" fontAlgn="auto" latinLnBrk="0" hangingPunct="1">
+                        <a:lnSpc>
+                          <a:spcPct val="100000"/>
+                        </a:lnSpc>
+                        <a:spcBef>
+                          <a:spcPts val="0"/>
+                        </a:spcBef>
+                        <a:spcAft>
+                          <a:spcPts val="0"/>
+                        </a:spcAft>
+                        <a:buClrTx/>
+                        <a:buSzTx/>
+                        <a:buFontTx/>
+                        <a:buNone/>
+                        <a:tabLst/>
+                        <a:defRPr/>
+                      </a:pPr>
+                      <a:r>
+                        <a:rPr lang="fr-FR" dirty="0" err="1"/>
+                        <a:t>Get</a:t>
+                      </a:r>
+                      <a:r>
+                        <a:rPr lang="fr-FR" dirty="0"/>
+                        <a:t> infos and return </a:t>
+                      </a:r>
+                      <a:r>
+                        <a:rPr lang="fr-FR" dirty="0" err="1"/>
+                        <a:t>them</a:t>
+                      </a:r>
+                      <a:endParaRPr lang="fr-FR" dirty="0"/>
+                    </a:p>
+                  </a:txBody>
+                  <a:tcPr/>
+                </a:tc>
+                <a:tc>
+                  <a:txBody>
+                    <a:bodyPr/>
+                    <a:lstStyle/>
+                    <a:p>
+                      <a:pPr marL="0" marR="0" lvl="0" indent="0" algn="l" defTabSz="914400" rtl="0" eaLnBrk="1" fontAlgn="auto" latinLnBrk="0" hangingPunct="1">
+                        <a:lnSpc>
+                          <a:spcPct val="100000"/>
+                        </a:lnSpc>
+                        <a:spcBef>
+                          <a:spcPts val="0"/>
+                        </a:spcBef>
+                        <a:spcAft>
+                          <a:spcPts val="0"/>
+                        </a:spcAft>
+                        <a:buClrTx/>
+                        <a:buSzTx/>
+                        <a:buFontTx/>
+                        <a:buNone/>
+                        <a:tabLst/>
+                        <a:defRPr/>
+                      </a:pPr>
+                      <a:r>
+                        <a:rPr lang="fr-FR" dirty="0"/>
+                        <a:t>CMD=GET_INFOS|&gt;</a:t>
+                      </a:r>
+                    </a:p>
+                  </a:txBody>
+                  <a:tcPr/>
+                </a:tc>
+                <a:extLst>
+                  <a:ext uri="{0D108BD9-81ED-4DB2-BD59-A6C34878D82A}">
+                    <a16:rowId xmlns:a16="http://schemas.microsoft.com/office/drawing/2014/main" val="3810878265"/>
+                  </a:ext>
+                </a:extLst>
+              </a:tr>
+              <a:tr h="1035379">
+                <a:tc>
+                  <a:txBody>
+                    <a:bodyPr/>
+                    <a:lstStyle/>
+                    <a:p>
+                      <a:pPr marL="0" marR="0" indent="0" algn="l" defTabSz="914400" rtl="0" eaLnBrk="1" fontAlgn="auto" latinLnBrk="0" hangingPunct="1">
+                        <a:lnSpc>
+                          <a:spcPct val="100000"/>
+                        </a:lnSpc>
+                        <a:spcBef>
+                          <a:spcPts val="0"/>
+                        </a:spcBef>
+                        <a:spcAft>
+                          <a:spcPts val="0"/>
+                        </a:spcAft>
+                        <a:buClrTx/>
+                        <a:buSzTx/>
+                        <a:buFontTx/>
+                        <a:buNone/>
+                        <a:tabLst/>
+                        <a:defRPr/>
+                      </a:pPr>
+                      <a:r>
+                        <a:rPr lang="fr-FR" dirty="0"/>
+                        <a:t>PI Communication mode</a:t>
+                      </a:r>
+                    </a:p>
+                    <a:p>
+                      <a:endParaRPr lang="fr-FR" dirty="0"/>
+                    </a:p>
+                  </a:txBody>
+                  <a:tcPr/>
+                </a:tc>
+                <a:tc>
+                  <a:txBody>
+                    <a:bodyPr/>
+                    <a:lstStyle/>
+                    <a:p>
+                      <a:pPr marL="0" marR="0" lvl="0" indent="0" algn="l" defTabSz="914400" rtl="0" eaLnBrk="1" fontAlgn="auto" latinLnBrk="0" hangingPunct="1">
+                        <a:lnSpc>
+                          <a:spcPct val="100000"/>
+                        </a:lnSpc>
+                        <a:spcBef>
+                          <a:spcPts val="0"/>
+                        </a:spcBef>
+                        <a:spcAft>
+                          <a:spcPts val="0"/>
+                        </a:spcAft>
+                        <a:buClrTx/>
+                        <a:buSzTx/>
+                        <a:buFontTx/>
+                        <a:buNone/>
+                        <a:tabLst/>
+                        <a:defRPr/>
+                      </a:pPr>
+                      <a:r>
+                        <a:rPr lang="fr-FR" dirty="0" err="1"/>
+                        <a:t>Define</a:t>
+                      </a:r>
+                      <a:r>
+                        <a:rPr lang="fr-FR" dirty="0"/>
+                        <a:t> the communication mode </a:t>
+                      </a:r>
+                      <a:r>
+                        <a:rPr lang="fr-FR" dirty="0" err="1"/>
+                        <a:t>between</a:t>
+                      </a:r>
+                      <a:r>
+                        <a:rPr lang="fr-FR" dirty="0"/>
+                        <a:t> the Robot and the </a:t>
+                      </a:r>
+                      <a:r>
+                        <a:rPr lang="fr-FR" dirty="0" err="1"/>
+                        <a:t>Raspberry</a:t>
+                      </a:r>
+                      <a:r>
+                        <a:rPr lang="fr-FR" dirty="0"/>
+                        <a:t> PI: </a:t>
+                      </a:r>
+                      <a:r>
+                        <a:rPr lang="fr-FR" dirty="0" err="1"/>
+                        <a:t>Alert</a:t>
+                      </a:r>
+                      <a:r>
+                        <a:rPr lang="fr-FR" dirty="0"/>
+                        <a:t> and Infos </a:t>
+                      </a:r>
+                      <a:r>
+                        <a:rPr lang="fr-FR" dirty="0" err="1"/>
+                        <a:t>every</a:t>
+                      </a:r>
+                      <a:r>
+                        <a:rPr lang="fr-FR" dirty="0"/>
+                        <a:t> 300 seconds</a:t>
+                      </a:r>
+                    </a:p>
+                  </a:txBody>
+                  <a:tcPr/>
+                </a:tc>
+                <a:tc>
+                  <a:txBody>
+                    <a:bodyPr/>
+                    <a:lstStyle/>
+                    <a:p>
+                      <a:pPr marL="0" marR="0" lvl="0" indent="0" algn="l" defTabSz="914400" rtl="0" eaLnBrk="1" fontAlgn="auto" latinLnBrk="0" hangingPunct="1">
+                        <a:lnSpc>
+                          <a:spcPct val="100000"/>
+                        </a:lnSpc>
+                        <a:spcBef>
+                          <a:spcPts val="0"/>
+                        </a:spcBef>
+                        <a:spcAft>
+                          <a:spcPts val="0"/>
+                        </a:spcAft>
+                        <a:buClrTx/>
+                        <a:buSzTx/>
+                        <a:buFontTx/>
+                        <a:buNone/>
+                        <a:tabLst/>
+                        <a:defRPr/>
+                      </a:pPr>
+                      <a:r>
+                        <a:rPr lang="fr-FR" dirty="0"/>
+                        <a:t>CMD=PI|P=2|300|&gt;</a:t>
+                      </a:r>
+                    </a:p>
+                    <a:p>
+                      <a:endParaRPr lang="fr-FR" dirty="0"/>
+                    </a:p>
+                  </a:txBody>
+                  <a:tcPr/>
+                </a:tc>
+                <a:extLst>
+                  <a:ext uri="{0D108BD9-81ED-4DB2-BD59-A6C34878D82A}">
+                    <a16:rowId xmlns:a16="http://schemas.microsoft.com/office/drawing/2014/main" val="10008"/>
+                  </a:ext>
+                </a:extLst>
+              </a:tr>
+              <a:tr h="389475">
+                <a:tc>
+                  <a:txBody>
+                    <a:bodyPr/>
+                    <a:lstStyle/>
+                    <a:p>
+                      <a:r>
+                        <a:rPr lang="fr-FR" dirty="0"/>
+                        <a:t>Move </a:t>
+                      </a:r>
+                      <a:r>
+                        <a:rPr lang="fr-FR" dirty="0" err="1"/>
+                        <a:t>Tilt&amp;Pan</a:t>
+                      </a:r>
+                      <a:endParaRPr lang="fr-FR" dirty="0"/>
+                    </a:p>
+                  </a:txBody>
+                  <a:tcPr/>
+                </a:tc>
+                <a:tc>
+                  <a:txBody>
+                    <a:bodyPr/>
+                    <a:lstStyle/>
+                    <a:p>
+                      <a:r>
+                        <a:rPr lang="fr-FR" dirty="0"/>
+                        <a:t>Move </a:t>
+                      </a:r>
+                      <a:r>
+                        <a:rPr lang="fr-FR" dirty="0" err="1"/>
+                        <a:t>Tilt&amp;Pan</a:t>
+                      </a:r>
+                      <a:r>
+                        <a:rPr lang="fr-FR" dirty="0"/>
+                        <a:t> </a:t>
+                      </a:r>
+                      <a:r>
+                        <a:rPr lang="fr-FR" dirty="0" err="1"/>
+                        <a:t>Horizontaly</a:t>
+                      </a:r>
+                      <a:r>
+                        <a:rPr lang="fr-FR" dirty="0"/>
+                        <a:t> and </a:t>
+                      </a:r>
+                      <a:r>
+                        <a:rPr lang="fr-FR" dirty="0" err="1"/>
+                        <a:t>Verticaly</a:t>
+                      </a:r>
+                      <a:endParaRPr lang="fr-FR" dirty="0"/>
+                    </a:p>
+                  </a:txBody>
+                  <a:tcPr/>
+                </a:tc>
+                <a:tc>
+                  <a:txBody>
+                    <a:bodyPr/>
+                    <a:lstStyle/>
+                    <a:p>
+                      <a:pPr marL="0" marR="0" lvl="0" indent="0" algn="l" defTabSz="914400" rtl="0" eaLnBrk="1" fontAlgn="auto" latinLnBrk="0" hangingPunct="1">
+                        <a:lnSpc>
+                          <a:spcPct val="100000"/>
+                        </a:lnSpc>
+                        <a:spcBef>
+                          <a:spcPts val="0"/>
+                        </a:spcBef>
+                        <a:spcAft>
+                          <a:spcPts val="0"/>
+                        </a:spcAft>
+                        <a:buClrTx/>
+                        <a:buSzTx/>
+                        <a:buFontTx/>
+                        <a:buNone/>
+                        <a:tabLst/>
+                        <a:defRPr/>
+                      </a:pPr>
+                      <a:r>
+                        <a:rPr lang="fr-FR" dirty="0"/>
+                        <a:t>CMD=M|P=</a:t>
+                      </a:r>
+                      <a:r>
+                        <a:rPr lang="fr-FR" dirty="0" err="1"/>
+                        <a:t>x|y</a:t>
+                      </a:r>
+                      <a:r>
+                        <a:rPr lang="fr-FR" dirty="0"/>
+                        <a:t>|&gt;</a:t>
+                      </a:r>
+                    </a:p>
+                  </a:txBody>
+                  <a:tcPr/>
+                </a:tc>
+                <a:extLst>
+                  <a:ext uri="{0D108BD9-81ED-4DB2-BD59-A6C34878D82A}">
+                    <a16:rowId xmlns:a16="http://schemas.microsoft.com/office/drawing/2014/main" val="3452581991"/>
+                  </a:ext>
+                </a:extLst>
+              </a:tr>
+              <a:tr h="389475">
+                <a:tc>
+                  <a:txBody>
+                    <a:bodyPr/>
+                    <a:lstStyle/>
+                    <a:p>
+                      <a:r>
+                        <a:rPr lang="fr-FR" dirty="0"/>
+                        <a:t>Test</a:t>
+                      </a:r>
+                    </a:p>
+                  </a:txBody>
+                  <a:tcPr/>
+                </a:tc>
+                <a:tc>
+                  <a:txBody>
+                    <a:bodyPr/>
+                    <a:lstStyle/>
+                    <a:p>
+                      <a:r>
+                        <a:rPr lang="fr-FR" dirty="0" err="1"/>
+                        <a:t>Send</a:t>
+                      </a:r>
+                      <a:r>
+                        <a:rPr lang="fr-FR" dirty="0"/>
+                        <a:t> a test command and check the feedback</a:t>
+                      </a:r>
+                    </a:p>
+                  </a:txBody>
+                  <a:tcPr/>
+                </a:tc>
+                <a:tc>
+                  <a:txBody>
+                    <a:bodyPr/>
+                    <a:lstStyle/>
+                    <a:p>
+                      <a:pPr marL="0" marR="0" lvl="0" indent="0" algn="l" defTabSz="914400" rtl="0" eaLnBrk="1" fontAlgn="auto" latinLnBrk="0" hangingPunct="1">
+                        <a:lnSpc>
+                          <a:spcPct val="100000"/>
+                        </a:lnSpc>
+                        <a:spcBef>
+                          <a:spcPts val="0"/>
+                        </a:spcBef>
+                        <a:spcAft>
+                          <a:spcPts val="0"/>
+                        </a:spcAft>
+                        <a:buClrTx/>
+                        <a:buSzTx/>
+                        <a:buFontTx/>
+                        <a:buNone/>
+                        <a:tabLst/>
+                        <a:defRPr/>
+                      </a:pPr>
+                      <a:r>
+                        <a:rPr lang="fr-FR" dirty="0"/>
+                        <a:t>CMD=T|P=2|1|0|3|4|&gt;</a:t>
+                      </a:r>
+                    </a:p>
+                  </a:txBody>
+                  <a:tcPr/>
+                </a:tc>
+                <a:extLst>
+                  <a:ext uri="{0D108BD9-81ED-4DB2-BD59-A6C34878D82A}">
+                    <a16:rowId xmlns:a16="http://schemas.microsoft.com/office/drawing/2014/main" val="10010"/>
+                  </a:ext>
+                </a:extLst>
+              </a:tr>
+            </a:tbl>
+          </a:graphicData>
+        </a:graphic>
+      </p:graphicFrame>
+    </p:spTree>
+    <p:extLst>
+      <p:ext uri="{BB962C8B-B14F-4D97-AF65-F5344CB8AC3E}">
+        <p14:creationId xmlns:p14="http://schemas.microsoft.com/office/powerpoint/2010/main" val="2985186838"/>
+      </p:ext>
+    </p:extLst>
+  </p:cSld>
+  <p:clrMapOvr>
+    <a:masterClrMapping/>
+  </p:clrMapOvr>
+</p:sld>
+</file>
+
+<file path=ppt/slides/slide9.xml><?xml version="1.0" encoding="utf-8"?>
+<p:sld xmlns:a="http://schemas.openxmlformats.org/drawingml/2006/main" xmlns:r="http://schemas.openxmlformats.org/officeDocument/2006/relationships" xmlns:p="http://schemas.openxmlformats.org/presentationml/2006/main">
+  <p:cSld>
+    <p:spTree>
+      <p:nvGrpSpPr>
+        <p:cNvPr id="1" name=""/>
+        <p:cNvGrpSpPr/>
+        <p:nvPr/>
+      </p:nvGrpSpPr>
+      <p:grpSpPr>
+        <a:xfrm>
+          <a:off x="0" y="0"/>
+          <a:ext cx="0" cy="0"/>
+          <a:chOff x="0" y="0"/>
+          <a:chExt cx="0" cy="0"/>
+        </a:xfrm>
+      </p:grpSpPr>
+      <p:sp>
+        <p:nvSpPr>
+          <p:cNvPr id="2" name="Titre 1">
+            <a:extLst>
+              <a:ext uri="{FF2B5EF4-FFF2-40B4-BE49-F238E27FC236}">
+                <a16:creationId xmlns:a16="http://schemas.microsoft.com/office/drawing/2014/main" id="{8DDCDBDF-D8CC-44B1-A599-F6FD2A53CCC8}"/>
+              </a:ext>
+            </a:extLst>
+          </p:cNvPr>
+          <p:cNvSpPr>
+            <a:spLocks noGrp="1"/>
+          </p:cNvSpPr>
+          <p:nvPr>
+            <p:ph type="title"/>
+          </p:nvPr>
+        </p:nvSpPr>
+        <p:spPr>
+          <a:xfrm>
+            <a:off x="723900" y="190500"/>
+            <a:ext cx="10515600" cy="750888"/>
+          </a:xfrm>
+        </p:spPr>
+        <p:txBody>
+          <a:bodyPr/>
+          <a:lstStyle/>
+          <a:p>
+            <a:r>
+              <a:rPr lang="en-US" dirty="0"/>
+              <a:t>WIFI Commands</a:t>
+            </a:r>
+          </a:p>
+        </p:txBody>
+      </p:sp>
+      <p:graphicFrame>
+        <p:nvGraphicFramePr>
+          <p:cNvPr id="4" name="Espace réservé du contenu 3">
+            <a:extLst>
+              <a:ext uri="{FF2B5EF4-FFF2-40B4-BE49-F238E27FC236}">
+                <a16:creationId xmlns:a16="http://schemas.microsoft.com/office/drawing/2014/main" id="{003D9151-9798-4FFF-84EB-CA24DBFE390D}"/>
+              </a:ext>
+            </a:extLst>
+          </p:cNvPr>
+          <p:cNvGraphicFramePr>
+            <a:graphicFrameLocks noGrp="1"/>
+          </p:cNvGraphicFramePr>
+          <p:nvPr>
+            <p:ph idx="1"/>
+            <p:extLst>
+              <p:ext uri="{D42A27DB-BD31-4B8C-83A1-F6EECF244321}">
+                <p14:modId xmlns:p14="http://schemas.microsoft.com/office/powerpoint/2010/main" val="1120469735"/>
               </p:ext>
             </p:extLst>
           </p:nvPr>
@@ -23942,34 +25295,13 @@
                     <a:bodyPr/>
                     <a:lstStyle/>
                     <a:p>
-                      <a:pPr marL="0" marR="0" lvl="0" indent="0" algn="l" defTabSz="914400" rtl="0" eaLnBrk="1" fontAlgn="auto" latinLnBrk="0" hangingPunct="1">
-                        <a:lnSpc>
-                          <a:spcPct val="100000"/>
-                        </a:lnSpc>
-                        <a:spcBef>
-                          <a:spcPts val="0"/>
-                        </a:spcBef>
-                        <a:spcAft>
-                          <a:spcPts val="0"/>
-                        </a:spcAft>
-                        <a:buClrTx/>
-                        <a:buSzTx/>
-                        <a:buFontTx/>
-                        <a:buNone/>
-                        <a:tabLst/>
-                        <a:defRPr/>
-                      </a:pPr>
+                      <a:r>
+                        <a:rPr lang="fr-FR" dirty="0" err="1"/>
+                        <a:t>Send</a:t>
+                      </a:r>
                       <a:r>
                         <a:rPr lang="fr-FR" dirty="0"/>
-                        <a:t>Test communication </a:t>
-                      </a:r>
-                      <a:r>
-                        <a:rPr lang="fr-FR" dirty="0" err="1"/>
-                        <a:t>with</a:t>
-                      </a:r>
-                      <a:r>
-                        <a:rPr lang="fr-FR" dirty="0"/>
-                        <a:t> the ESP8266 server</a:t>
+                        <a:t> a test command and check the feedback</a:t>
                       </a:r>
                     </a:p>
                   </a:txBody>
@@ -24887,7 +26219,7 @@
                       </a:r>
                     </a:p>
                     <a:p>
-                      <a:pPr marL="342900" marR="0" lvl="0" indent="-342900" algn="l" defTabSz="914400" rtl="0" eaLnBrk="1" fontAlgn="auto" latinLnBrk="0" hangingPunct="1">
+                      <a:pPr marL="0" marR="0" lvl="0" indent="0" algn="l" defTabSz="914400" rtl="0" eaLnBrk="1" fontAlgn="auto" latinLnBrk="0" hangingPunct="1">
                         <a:lnSpc>
                           <a:spcPct val="100000"/>
                         </a:lnSpc>
@@ -24900,17 +26232,17 @@
                         <a:buClrTx/>
                         <a:buSzTx/>
                         <a:buFont typeface="+mj-lt"/>
-                        <a:buAutoNum type="arabicPeriod"/>
+                        <a:buNone/>
                         <a:tabLst/>
                         <a:defRPr/>
                       </a:pPr>
                       <a:r>
                         <a:rPr lang="fr-FR" dirty="0"/>
-                        <a:t>None</a:t>
+                        <a:t>0: None</a:t>
                       </a:r>
                     </a:p>
                     <a:p>
-                      <a:pPr marL="342900" marR="0" lvl="0" indent="-342900" algn="l" defTabSz="914400" rtl="0" eaLnBrk="1" fontAlgn="auto" latinLnBrk="0" hangingPunct="1">
+                      <a:pPr marL="0" marR="0" lvl="0" indent="0" algn="l" defTabSz="914400" rtl="0" eaLnBrk="1" fontAlgn="auto" latinLnBrk="0" hangingPunct="1">
                         <a:lnSpc>
                           <a:spcPct val="100000"/>
                         </a:lnSpc>
@@ -24923,11 +26255,15 @@
                         <a:buClrTx/>
                         <a:buSzTx/>
                         <a:buFont typeface="+mj-lt"/>
-                        <a:buAutoNum type="arabicPeriod"/>
+                        <a:buNone/>
                         <a:tabLst/>
                         <a:defRPr/>
                       </a:pPr>
                       <a:r>
+                        <a:rPr lang="fr-FR" dirty="0"/>
+                        <a:t>1: </a:t>
+                      </a:r>
+                      <a:r>
                         <a:rPr lang="fr-FR" dirty="0" err="1"/>
                         <a:t>Alert</a:t>
                       </a:r>
@@ -24942,7 +26278,7 @@
                       <a:endParaRPr lang="fr-FR" dirty="0"/>
                     </a:p>
                     <a:p>
-                      <a:pPr marL="342900" marR="0" lvl="0" indent="-342900" algn="l" defTabSz="914400" rtl="0" eaLnBrk="1" fontAlgn="auto" latinLnBrk="0" hangingPunct="1">
+                      <a:pPr marL="0" marR="0" lvl="0" indent="0" algn="l" defTabSz="914400" rtl="0" eaLnBrk="1" fontAlgn="auto" latinLnBrk="0" hangingPunct="1">
                         <a:lnSpc>
                           <a:spcPct val="100000"/>
                         </a:lnSpc>
@@ -24955,10 +26291,14 @@
                         <a:buClrTx/>
                         <a:buSzTx/>
                         <a:buFont typeface="+mj-lt"/>
-                        <a:buAutoNum type="arabicPeriod"/>
+                        <a:buNone/>
                         <a:tabLst/>
                         <a:defRPr/>
                       </a:pPr>
+                      <a:r>
+                        <a:rPr lang="fr-FR" dirty="0"/>
+                        <a:t>2: </a:t>
+                      </a:r>
                       <a:r>
                         <a:rPr lang="fr-FR" dirty="0" err="1"/>
                         <a:t>Alert</a:t>
@@ -25001,20 +26341,23 @@
                         <a:tabLst/>
                         <a:defRPr/>
                       </a:pPr>
-                      <a:endParaRPr kumimoji="0" lang="en-US" sz="1800" b="0" i="0" u="none" strike="noStrike" kern="1200" cap="none" spc="0" normalizeH="0" baseline="0" noProof="0" dirty="0">
-                        <a:ln>
-                          <a:noFill/>
-                        </a:ln>
-                        <a:solidFill>
-                          <a:srgbClr val="00B050"/>
-                        </a:solidFill>
-                        <a:effectLst/>
-                        <a:uLnTx/>
-                        <a:uFillTx/>
-                        <a:latin typeface="Calibri" panose="020F0502020204030204"/>
-                        <a:ea typeface="+mn-ea"/>
-                        <a:cs typeface="+mn-cs"/>
-                      </a:endParaRPr>
+                      <a:r>
+                        <a:rPr kumimoji="0" lang="en-US" sz="1800" b="0" i="0" u="none" strike="noStrike" kern="1200" cap="none" spc="0" normalizeH="0" baseline="0" noProof="0" dirty="0">
+                          <a:ln>
+                            <a:noFill/>
+                          </a:ln>
+                          <a:solidFill>
+                            <a:srgbClr val="00B050"/>
+                          </a:solidFill>
+                          <a:effectLst/>
+                          <a:uLnTx/>
+                          <a:uFillTx/>
+                          <a:latin typeface="Calibri" panose="020F0502020204030204"/>
+                          <a:ea typeface="+mn-ea"/>
+                          <a:cs typeface="+mn-cs"/>
+                        </a:rPr>
+                        <a:t>: </a:t>
+                      </a:r>
                     </a:p>
                   </a:txBody>
                   <a:tcPr/>
@@ -25033,254 +26376,6 @@
     <p:extLst>
       <p:ext uri="{BB962C8B-B14F-4D97-AF65-F5344CB8AC3E}">
         <p14:creationId xmlns:p14="http://schemas.microsoft.com/office/powerpoint/2010/main" val="3187012288"/>
-      </p:ext>
-    </p:extLst>
-  </p:cSld>
-  <p:clrMapOvr>
-    <a:masterClrMapping/>
-  </p:clrMapOvr>
-</p:sld>
-</file>
-
-<file path=ppt/slides/slide9.xml><?xml version="1.0" encoding="utf-8"?>
-<p:sld xmlns:a="http://schemas.openxmlformats.org/drawingml/2006/main" xmlns:r="http://schemas.openxmlformats.org/officeDocument/2006/relationships" xmlns:p="http://schemas.openxmlformats.org/presentationml/2006/main">
-  <p:cSld>
-    <p:spTree>
-      <p:nvGrpSpPr>
-        <p:cNvPr id="1" name=""/>
-        <p:cNvGrpSpPr/>
-        <p:nvPr/>
-      </p:nvGrpSpPr>
-      <p:grpSpPr>
-        <a:xfrm>
-          <a:off x="0" y="0"/>
-          <a:ext cx="0" cy="0"/>
-          <a:chOff x="0" y="0"/>
-          <a:chExt cx="0" cy="0"/>
-        </a:xfrm>
-      </p:grpSpPr>
-      <p:sp>
-        <p:nvSpPr>
-          <p:cNvPr id="2" name="Titre 1">
-            <a:extLst>
-              <a:ext uri="{FF2B5EF4-FFF2-40B4-BE49-F238E27FC236}">
-                <a16:creationId xmlns:a16="http://schemas.microsoft.com/office/drawing/2014/main" id="{7D7887D6-7566-47C9-A25C-3F4F54D9EBDC}"/>
-              </a:ext>
-            </a:extLst>
-          </p:cNvPr>
-          <p:cNvSpPr>
-            <a:spLocks noGrp="1"/>
-          </p:cNvSpPr>
-          <p:nvPr>
-            <p:ph type="title"/>
-          </p:nvPr>
-        </p:nvSpPr>
-        <p:spPr/>
-        <p:txBody>
-          <a:bodyPr/>
-          <a:lstStyle/>
-          <a:p>
-            <a:r>
-              <a:rPr lang="fr-FR" dirty="0" err="1"/>
-              <a:t>Special</a:t>
-            </a:r>
-            <a:r>
-              <a:rPr lang="fr-FR" dirty="0"/>
-              <a:t> pins Arduino MEGA2560</a:t>
-            </a:r>
-          </a:p>
-        </p:txBody>
-      </p:sp>
-      <p:sp>
-        <p:nvSpPr>
-          <p:cNvPr id="3" name="Espace réservé du contenu 2">
-            <a:extLst>
-              <a:ext uri="{FF2B5EF4-FFF2-40B4-BE49-F238E27FC236}">
-                <a16:creationId xmlns:a16="http://schemas.microsoft.com/office/drawing/2014/main" id="{570C9186-32F7-45DB-A01D-E527B032981A}"/>
-              </a:ext>
-            </a:extLst>
-          </p:cNvPr>
-          <p:cNvSpPr>
-            <a:spLocks noGrp="1"/>
-          </p:cNvSpPr>
-          <p:nvPr>
-            <p:ph idx="1"/>
-          </p:nvPr>
-        </p:nvSpPr>
-        <p:spPr/>
-        <p:txBody>
-          <a:bodyPr>
-            <a:normAutofit fontScale="77500" lnSpcReduction="20000"/>
-          </a:bodyPr>
-          <a:lstStyle/>
-          <a:p>
-            <a:pPr marL="0" indent="0">
-              <a:buNone/>
-            </a:pPr>
-            <a:r>
-              <a:rPr lang="fr-FR" sz="3500" u="sng" dirty="0"/>
-              <a:t>Interruptions</a:t>
-            </a:r>
-          </a:p>
-          <a:p>
-            <a:pPr marL="0" indent="0">
-              <a:buNone/>
-            </a:pPr>
-            <a:r>
-              <a:rPr lang="fr-FR" dirty="0"/>
-              <a:t>Pin #2 = interruption #0</a:t>
-            </a:r>
-            <a:br>
-              <a:rPr lang="fr-FR" dirty="0"/>
-            </a:br>
-            <a:r>
-              <a:rPr lang="fr-FR" dirty="0"/>
-              <a:t>Pin #3 = interruption #1</a:t>
-            </a:r>
-            <a:br>
-              <a:rPr lang="fr-FR" dirty="0"/>
-            </a:br>
-            <a:r>
-              <a:rPr lang="fr-FR" dirty="0"/>
-              <a:t>Pin #18 = interruption #5</a:t>
-            </a:r>
-            <a:br>
-              <a:rPr lang="fr-FR" dirty="0"/>
-            </a:br>
-            <a:r>
-              <a:rPr lang="fr-FR" dirty="0"/>
-              <a:t>Pin #19 = interruption #4</a:t>
-            </a:r>
-            <a:br>
-              <a:rPr lang="fr-FR" dirty="0"/>
-            </a:br>
-            <a:r>
-              <a:rPr lang="fr-FR" dirty="0"/>
-              <a:t>Pin #20 = interruption #3</a:t>
-            </a:r>
-            <a:br>
-              <a:rPr lang="fr-FR" dirty="0"/>
-            </a:br>
-            <a:r>
-              <a:rPr lang="fr-FR" dirty="0"/>
-              <a:t>Pin #21 = interruption #2</a:t>
-            </a:r>
-          </a:p>
-          <a:p>
-            <a:pPr marL="0" indent="0">
-              <a:buNone/>
-            </a:pPr>
-            <a:endParaRPr lang="fr-FR" dirty="0"/>
-          </a:p>
-          <a:p>
-            <a:pPr marL="0" indent="0">
-              <a:buNone/>
-            </a:pPr>
-            <a:r>
-              <a:rPr lang="fr-FR" sz="3500" u="sng" dirty="0"/>
-              <a:t>SPI</a:t>
-            </a:r>
-          </a:p>
-          <a:p>
-            <a:pPr marL="0" indent="0">
-              <a:buNone/>
-            </a:pPr>
-            <a:r>
-              <a:rPr lang="fi-FI" dirty="0"/>
-              <a:t>Pin</a:t>
-            </a:r>
-            <a:r>
-              <a:rPr lang="fr-FR" dirty="0"/>
-              <a:t> #</a:t>
-            </a:r>
-            <a:r>
-              <a:rPr lang="fi-FI" dirty="0"/>
-              <a:t>10: CS</a:t>
-            </a:r>
-            <a:endParaRPr lang="fr-FR" dirty="0"/>
-          </a:p>
-          <a:p>
-            <a:pPr marL="0" indent="0">
-              <a:buNone/>
-            </a:pPr>
-            <a:r>
-              <a:rPr lang="fi-FI" dirty="0"/>
-              <a:t>pin</a:t>
-            </a:r>
-            <a:r>
-              <a:rPr lang="fr-FR" dirty="0"/>
-              <a:t> #</a:t>
-            </a:r>
-            <a:r>
-              <a:rPr lang="fi-FI" dirty="0"/>
-              <a:t>11-&gt;pin</a:t>
-            </a:r>
-            <a:r>
-              <a:rPr lang="fr-FR" dirty="0"/>
-              <a:t> #</a:t>
-            </a:r>
-            <a:r>
-              <a:rPr lang="fi-FI" dirty="0"/>
-              <a:t>51</a:t>
-            </a:r>
-          </a:p>
-          <a:p>
-            <a:pPr marL="0" indent="0">
-              <a:buNone/>
-            </a:pPr>
-            <a:r>
-              <a:rPr lang="fi-FI" dirty="0"/>
-              <a:t>pin</a:t>
-            </a:r>
-            <a:r>
-              <a:rPr lang="fr-FR" dirty="0"/>
-              <a:t> #</a:t>
-            </a:r>
-            <a:r>
-              <a:rPr lang="fi-FI" dirty="0"/>
-              <a:t>12-&gt;pin</a:t>
-            </a:r>
-            <a:r>
-              <a:rPr lang="fr-FR" dirty="0"/>
-              <a:t> #</a:t>
-            </a:r>
-            <a:r>
-              <a:rPr lang="fi-FI" dirty="0"/>
-              <a:t>50</a:t>
-            </a:r>
-          </a:p>
-          <a:p>
-            <a:pPr marL="0" indent="0">
-              <a:buNone/>
-            </a:pPr>
-            <a:r>
-              <a:rPr lang="fi-FI" dirty="0"/>
-              <a:t>pin</a:t>
-            </a:r>
-            <a:r>
-              <a:rPr lang="fr-FR" dirty="0"/>
-              <a:t> #</a:t>
-            </a:r>
-            <a:r>
-              <a:rPr lang="fi-FI" dirty="0"/>
-              <a:t>13-&gt;pin</a:t>
-            </a:r>
-            <a:r>
-              <a:rPr lang="fr-FR" dirty="0"/>
-              <a:t> #</a:t>
-            </a:r>
-            <a:r>
-              <a:rPr lang="fi-FI" dirty="0"/>
-              <a:t>52</a:t>
-            </a:r>
-            <a:endParaRPr lang="fr-FR" dirty="0"/>
-          </a:p>
-        </p:txBody>
-      </p:sp>
-    </p:spTree>
-    <p:extLst>
-      <p:ext uri="{BB962C8B-B14F-4D97-AF65-F5344CB8AC3E}">
-        <p14:creationId xmlns:p14="http://schemas.microsoft.com/office/powerpoint/2010/main" val="3722056244"/>
       </p:ext>
     </p:extLst>
   </p:cSld>

</xml_diff>